<commit_message>
ppt 2 and 3
</commit_message>
<xml_diff>
--- a/Snake-2.pptx
+++ b/Snake-2.pptx
@@ -2,32 +2,32 @@
 <file path=ppt/presentation.xml><?xml version="1.0" encoding="utf-8"?>
 <p:presentation xmlns:a="http://schemas.openxmlformats.org/drawingml/2006/main" xmlns:r="http://schemas.openxmlformats.org/officeDocument/2006/relationships" xmlns:p="http://schemas.openxmlformats.org/presentationml/2006/main" saveSubsetFonts="1">
   <p:sldMasterIdLst>
-    <p:sldMasterId id="2147483648" r:id="rId1"/>
+    <p:sldMasterId id="2147483648" r:id="rId3"/>
   </p:sldMasterIdLst>
   <p:sldIdLst>
-    <p:sldId id="256" r:id="rId2"/>
-    <p:sldId id="278" r:id="rId3"/>
-    <p:sldId id="280" r:id="rId4"/>
-    <p:sldId id="281" r:id="rId5"/>
-    <p:sldId id="282" r:id="rId6"/>
-    <p:sldId id="283" r:id="rId7"/>
-    <p:sldId id="284" r:id="rId8"/>
-    <p:sldId id="285" r:id="rId9"/>
-    <p:sldId id="286" r:id="rId10"/>
-    <p:sldId id="287" r:id="rId11"/>
-    <p:sldId id="288" r:id="rId12"/>
-    <p:sldId id="289" r:id="rId13"/>
-    <p:sldId id="290" r:id="rId14"/>
-    <p:sldId id="291" r:id="rId15"/>
-    <p:sldId id="292" r:id="rId16"/>
-    <p:sldId id="293" r:id="rId17"/>
-    <p:sldId id="294" r:id="rId18"/>
-    <p:sldId id="295" r:id="rId19"/>
-    <p:sldId id="296" r:id="rId20"/>
-    <p:sldId id="297" r:id="rId21"/>
-    <p:sldId id="298" r:id="rId22"/>
-    <p:sldId id="299" r:id="rId23"/>
-    <p:sldId id="300" r:id="rId24"/>
+    <p:sldId id="256" r:id="rId4"/>
+    <p:sldId id="278" r:id="rId5"/>
+    <p:sldId id="280" r:id="rId6"/>
+    <p:sldId id="281" r:id="rId7"/>
+    <p:sldId id="282" r:id="rId8"/>
+    <p:sldId id="283" r:id="rId9"/>
+    <p:sldId id="284" r:id="rId10"/>
+    <p:sldId id="285" r:id="rId11"/>
+    <p:sldId id="286" r:id="rId12"/>
+    <p:sldId id="287" r:id="rId13"/>
+    <p:sldId id="288" r:id="rId14"/>
+    <p:sldId id="289" r:id="rId15"/>
+    <p:sldId id="290" r:id="rId16"/>
+    <p:sldId id="291" r:id="rId17"/>
+    <p:sldId id="292" r:id="rId18"/>
+    <p:sldId id="293" r:id="rId19"/>
+    <p:sldId id="294" r:id="rId20"/>
+    <p:sldId id="295" r:id="rId21"/>
+    <p:sldId id="296" r:id="rId22"/>
+    <p:sldId id="297" r:id="rId23"/>
+    <p:sldId id="298" r:id="rId24"/>
+    <p:sldId id="299" r:id="rId25"/>
+    <p:sldId id="300" r:id="rId26"/>
   </p:sldIdLst>
   <p:sldSz cx="12192000" cy="6858000"/>
   <p:notesSz cx="6858000" cy="9144000"/>
@@ -145,836 +145,6 @@
 <file path=ppt/changesInfos/changesInfo1.xml><?xml version="1.0" encoding="utf-8"?>
 <pc:chgInfo xmlns:a="http://schemas.openxmlformats.org/drawingml/2006/main" xmlns:r="http://schemas.openxmlformats.org/officeDocument/2006/relationships" xmlns:ac="http://schemas.microsoft.com/office/drawing/2013/main/command" xmlns:pc="http://schemas.microsoft.com/office/powerpoint/2013/main/command">
   <pc:docChgLst>
-    <pc:chgData name="Geoff Butcher" userId="1cb31d20-838c-4d88-81d0-dc1a78ccb326" providerId="ADAL" clId="{A42B9E86-A0DE-4982-A141-66AF500C2B3B}"/>
-    <pc:docChg chg="undo custSel addSld delSld modSld sldOrd modMainMaster">
-      <pc:chgData name="Geoff Butcher" userId="1cb31d20-838c-4d88-81d0-dc1a78ccb326" providerId="ADAL" clId="{A42B9E86-A0DE-4982-A141-66AF500C2B3B}" dt="2021-02-08T12:18:24.525" v="7624" actId="1076"/>
-      <pc:docMkLst>
-        <pc:docMk/>
-      </pc:docMkLst>
-      <pc:sldChg chg="modSp mod">
-        <pc:chgData name="Geoff Butcher" userId="1cb31d20-838c-4d88-81d0-dc1a78ccb326" providerId="ADAL" clId="{A42B9E86-A0DE-4982-A141-66AF500C2B3B}" dt="2021-02-07T18:33:26.476" v="854" actId="20577"/>
-        <pc:sldMkLst>
-          <pc:docMk/>
-          <pc:sldMk cId="1623591203" sldId="256"/>
-        </pc:sldMkLst>
-        <pc:spChg chg="mod">
-          <ac:chgData name="Geoff Butcher" userId="1cb31d20-838c-4d88-81d0-dc1a78ccb326" providerId="ADAL" clId="{A42B9E86-A0DE-4982-A141-66AF500C2B3B}" dt="2021-02-07T18:33:26.476" v="854" actId="20577"/>
-          <ac:spMkLst>
-            <pc:docMk/>
-            <pc:sldMk cId="1623591203" sldId="256"/>
-            <ac:spMk id="3" creationId="{6C3DF028-08B5-467A-BCAB-6E353E480A02}"/>
-          </ac:spMkLst>
-        </pc:spChg>
-      </pc:sldChg>
-      <pc:sldChg chg="del">
-        <pc:chgData name="Geoff Butcher" userId="1cb31d20-838c-4d88-81d0-dc1a78ccb326" providerId="ADAL" clId="{A42B9E86-A0DE-4982-A141-66AF500C2B3B}" dt="2021-02-07T18:16:40.090" v="0" actId="47"/>
-        <pc:sldMkLst>
-          <pc:docMk/>
-          <pc:sldMk cId="2282438210" sldId="276"/>
-        </pc:sldMkLst>
-      </pc:sldChg>
-      <pc:sldChg chg="addSp delSp modSp new mod">
-        <pc:chgData name="Geoff Butcher" userId="1cb31d20-838c-4d88-81d0-dc1a78ccb326" providerId="ADAL" clId="{A42B9E86-A0DE-4982-A141-66AF500C2B3B}" dt="2021-02-07T18:22:24.777" v="760" actId="27636"/>
-        <pc:sldMkLst>
-          <pc:docMk/>
-          <pc:sldMk cId="1502008898" sldId="278"/>
-        </pc:sldMkLst>
-        <pc:spChg chg="mod">
-          <ac:chgData name="Geoff Butcher" userId="1cb31d20-838c-4d88-81d0-dc1a78ccb326" providerId="ADAL" clId="{A42B9E86-A0DE-4982-A141-66AF500C2B3B}" dt="2021-02-07T18:16:53.605" v="35" actId="20577"/>
-          <ac:spMkLst>
-            <pc:docMk/>
-            <pc:sldMk cId="1502008898" sldId="278"/>
-            <ac:spMk id="2" creationId="{A0B28261-B967-4C68-8783-7DCBD049E8FD}"/>
-          </ac:spMkLst>
-        </pc:spChg>
-        <pc:spChg chg="add del mod">
-          <ac:chgData name="Geoff Butcher" userId="1cb31d20-838c-4d88-81d0-dc1a78ccb326" providerId="ADAL" clId="{A42B9E86-A0DE-4982-A141-66AF500C2B3B}" dt="2021-02-07T18:22:24.777" v="760" actId="27636"/>
-          <ac:spMkLst>
-            <pc:docMk/>
-            <pc:sldMk cId="1502008898" sldId="278"/>
-            <ac:spMk id="3" creationId="{C21548A7-856A-423C-B856-D820BC415E43}"/>
-          </ac:spMkLst>
-        </pc:spChg>
-        <pc:spChg chg="add del mod">
-          <ac:chgData name="Geoff Butcher" userId="1cb31d20-838c-4d88-81d0-dc1a78ccb326" providerId="ADAL" clId="{A42B9E86-A0DE-4982-A141-66AF500C2B3B}" dt="2021-02-07T18:19:38.406" v="299" actId="11529"/>
-          <ac:spMkLst>
-            <pc:docMk/>
-            <pc:sldMk cId="1502008898" sldId="278"/>
-            <ac:spMk id="4" creationId="{6B1081A9-04CA-4F67-988E-DF0BB5107602}"/>
-          </ac:spMkLst>
-        </pc:spChg>
-        <pc:spChg chg="add mod">
-          <ac:chgData name="Geoff Butcher" userId="1cb31d20-838c-4d88-81d0-dc1a78ccb326" providerId="ADAL" clId="{A42B9E86-A0DE-4982-A141-66AF500C2B3B}" dt="2021-02-07T18:19:36.815" v="294" actId="571"/>
-          <ac:spMkLst>
-            <pc:docMk/>
-            <pc:sldMk cId="1502008898" sldId="278"/>
-            <ac:spMk id="5" creationId="{937217AB-9F7C-4CC6-A39C-B1A9CFA38FB6}"/>
-          </ac:spMkLst>
-        </pc:spChg>
-        <pc:spChg chg="add mod">
-          <ac:chgData name="Geoff Butcher" userId="1cb31d20-838c-4d88-81d0-dc1a78ccb326" providerId="ADAL" clId="{A42B9E86-A0DE-4982-A141-66AF500C2B3B}" dt="2021-02-07T18:21:12.582" v="585" actId="115"/>
-          <ac:spMkLst>
-            <pc:docMk/>
-            <pc:sldMk cId="1502008898" sldId="278"/>
-            <ac:spMk id="6" creationId="{905F5F27-5928-4697-8A64-521401D86C88}"/>
-          </ac:spMkLst>
-        </pc:spChg>
-        <pc:spChg chg="add mod">
-          <ac:chgData name="Geoff Butcher" userId="1cb31d20-838c-4d88-81d0-dc1a78ccb326" providerId="ADAL" clId="{A42B9E86-A0DE-4982-A141-66AF500C2B3B}" dt="2021-02-07T18:21:39.866" v="651" actId="20577"/>
-          <ac:spMkLst>
-            <pc:docMk/>
-            <pc:sldMk cId="1502008898" sldId="278"/>
-            <ac:spMk id="7" creationId="{D7E50970-73DE-49D3-A73D-532500ADEAEC}"/>
-          </ac:spMkLst>
-        </pc:spChg>
-      </pc:sldChg>
-      <pc:sldChg chg="modSp add mod">
-        <pc:chgData name="Geoff Butcher" userId="1cb31d20-838c-4d88-81d0-dc1a78ccb326" providerId="ADAL" clId="{A42B9E86-A0DE-4982-A141-66AF500C2B3B}" dt="2021-02-07T18:23:12.328" v="810" actId="1076"/>
-        <pc:sldMkLst>
-          <pc:docMk/>
-          <pc:sldMk cId="2748250560" sldId="279"/>
-        </pc:sldMkLst>
-        <pc:spChg chg="mod">
-          <ac:chgData name="Geoff Butcher" userId="1cb31d20-838c-4d88-81d0-dc1a78ccb326" providerId="ADAL" clId="{A42B9E86-A0DE-4982-A141-66AF500C2B3B}" dt="2021-02-07T18:23:12.328" v="810" actId="1076"/>
-          <ac:spMkLst>
-            <pc:docMk/>
-            <pc:sldMk cId="2748250560" sldId="279"/>
-            <ac:spMk id="6" creationId="{905F5F27-5928-4697-8A64-521401D86C88}"/>
-          </ac:spMkLst>
-        </pc:spChg>
-        <pc:spChg chg="mod">
-          <ac:chgData name="Geoff Butcher" userId="1cb31d20-838c-4d88-81d0-dc1a78ccb326" providerId="ADAL" clId="{A42B9E86-A0DE-4982-A141-66AF500C2B3B}" dt="2021-02-07T18:23:11.208" v="809" actId="1076"/>
-          <ac:spMkLst>
-            <pc:docMk/>
-            <pc:sldMk cId="2748250560" sldId="279"/>
-            <ac:spMk id="7" creationId="{D7E50970-73DE-49D3-A73D-532500ADEAEC}"/>
-          </ac:spMkLst>
-        </pc:spChg>
-      </pc:sldChg>
-      <pc:sldChg chg="addSp delSp modSp new mod">
-        <pc:chgData name="Geoff Butcher" userId="1cb31d20-838c-4d88-81d0-dc1a78ccb326" providerId="ADAL" clId="{A42B9E86-A0DE-4982-A141-66AF500C2B3B}" dt="2021-02-07T18:42:17.722" v="1692"/>
-        <pc:sldMkLst>
-          <pc:docMk/>
-          <pc:sldMk cId="1254132252" sldId="280"/>
-        </pc:sldMkLst>
-        <pc:spChg chg="mod">
-          <ac:chgData name="Geoff Butcher" userId="1cb31d20-838c-4d88-81d0-dc1a78ccb326" providerId="ADAL" clId="{A42B9E86-A0DE-4982-A141-66AF500C2B3B}" dt="2021-02-07T18:33:41.168" v="856"/>
-          <ac:spMkLst>
-            <pc:docMk/>
-            <pc:sldMk cId="1254132252" sldId="280"/>
-            <ac:spMk id="2" creationId="{6EDF3730-F26B-4759-A1BB-6821D85BA9A8}"/>
-          </ac:spMkLst>
-        </pc:spChg>
-        <pc:spChg chg="mod">
-          <ac:chgData name="Geoff Butcher" userId="1cb31d20-838c-4d88-81d0-dc1a78ccb326" providerId="ADAL" clId="{A42B9E86-A0DE-4982-A141-66AF500C2B3B}" dt="2021-02-07T18:40:04.664" v="1627" actId="27636"/>
-          <ac:spMkLst>
-            <pc:docMk/>
-            <pc:sldMk cId="1254132252" sldId="280"/>
-            <ac:spMk id="3" creationId="{FA8CECFA-1E6F-4264-A092-BAEA1D19BCFA}"/>
-          </ac:spMkLst>
-        </pc:spChg>
-        <pc:spChg chg="add del mod">
-          <ac:chgData name="Geoff Butcher" userId="1cb31d20-838c-4d88-81d0-dc1a78ccb326" providerId="ADAL" clId="{A42B9E86-A0DE-4982-A141-66AF500C2B3B}" dt="2021-02-07T18:42:17.722" v="1692"/>
-          <ac:spMkLst>
-            <pc:docMk/>
-            <pc:sldMk cId="1254132252" sldId="280"/>
-            <ac:spMk id="6" creationId="{59C38871-B1E4-4023-91FE-407B3275FCE3}"/>
-          </ac:spMkLst>
-        </pc:spChg>
-        <pc:picChg chg="add mod">
-          <ac:chgData name="Geoff Butcher" userId="1cb31d20-838c-4d88-81d0-dc1a78ccb326" providerId="ADAL" clId="{A42B9E86-A0DE-4982-A141-66AF500C2B3B}" dt="2021-02-07T18:35:15.175" v="867" actId="1076"/>
-          <ac:picMkLst>
-            <pc:docMk/>
-            <pc:sldMk cId="1254132252" sldId="280"/>
-            <ac:picMk id="5" creationId="{6C7FCA2E-8E18-4052-9F9E-737F534F33EA}"/>
-          </ac:picMkLst>
-        </pc:picChg>
-      </pc:sldChg>
-      <pc:sldChg chg="addSp delSp modSp new mod">
-        <pc:chgData name="Geoff Butcher" userId="1cb31d20-838c-4d88-81d0-dc1a78ccb326" providerId="ADAL" clId="{A42B9E86-A0DE-4982-A141-66AF500C2B3B}" dt="2021-02-07T19:36:45.688" v="2176" actId="1076"/>
-        <pc:sldMkLst>
-          <pc:docMk/>
-          <pc:sldMk cId="104411360" sldId="281"/>
-        </pc:sldMkLst>
-        <pc:spChg chg="mod">
-          <ac:chgData name="Geoff Butcher" userId="1cb31d20-838c-4d88-81d0-dc1a78ccb326" providerId="ADAL" clId="{A42B9E86-A0DE-4982-A141-66AF500C2B3B}" dt="2021-02-07T18:40:35.288" v="1683" actId="20577"/>
-          <ac:spMkLst>
-            <pc:docMk/>
-            <pc:sldMk cId="104411360" sldId="281"/>
-            <ac:spMk id="2" creationId="{0F6ECDB8-7AFF-4730-B306-16237845B1A1}"/>
-          </ac:spMkLst>
-        </pc:spChg>
-        <pc:spChg chg="del mod">
-          <ac:chgData name="Geoff Butcher" userId="1cb31d20-838c-4d88-81d0-dc1a78ccb326" providerId="ADAL" clId="{A42B9E86-A0DE-4982-A141-66AF500C2B3B}" dt="2021-02-07T18:42:00.641" v="1685" actId="931"/>
-          <ac:spMkLst>
-            <pc:docMk/>
-            <pc:sldMk cId="104411360" sldId="281"/>
-            <ac:spMk id="3" creationId="{B9C9CD9D-3A09-445D-AC2E-089A31A06445}"/>
-          </ac:spMkLst>
-        </pc:spChg>
-        <pc:spChg chg="add mod">
-          <ac:chgData name="Geoff Butcher" userId="1cb31d20-838c-4d88-81d0-dc1a78ccb326" providerId="ADAL" clId="{A42B9E86-A0DE-4982-A141-66AF500C2B3B}" dt="2021-02-07T18:44:25.051" v="2113" actId="20577"/>
-          <ac:spMkLst>
-            <pc:docMk/>
-            <pc:sldMk cId="104411360" sldId="281"/>
-            <ac:spMk id="6" creationId="{B959F6FB-8BD4-4026-8E2F-CE496E462396}"/>
-          </ac:spMkLst>
-        </pc:spChg>
-        <pc:graphicFrameChg chg="add mod modGraphic">
-          <ac:chgData name="Geoff Butcher" userId="1cb31d20-838c-4d88-81d0-dc1a78ccb326" providerId="ADAL" clId="{A42B9E86-A0DE-4982-A141-66AF500C2B3B}" dt="2021-02-07T18:45:32.115" v="2174" actId="1076"/>
-          <ac:graphicFrameMkLst>
-            <pc:docMk/>
-            <pc:sldMk cId="104411360" sldId="281"/>
-            <ac:graphicFrameMk id="7" creationId="{5D3856FC-198E-450B-96C1-43069028B324}"/>
-          </ac:graphicFrameMkLst>
-        </pc:graphicFrameChg>
-        <pc:picChg chg="add mod">
-          <ac:chgData name="Geoff Butcher" userId="1cb31d20-838c-4d88-81d0-dc1a78ccb326" providerId="ADAL" clId="{A42B9E86-A0DE-4982-A141-66AF500C2B3B}" dt="2021-02-07T19:36:45.688" v="2176" actId="1076"/>
-          <ac:picMkLst>
-            <pc:docMk/>
-            <pc:sldMk cId="104411360" sldId="281"/>
-            <ac:picMk id="5" creationId="{F0B28B21-C82F-4449-86B0-75867275416A}"/>
-          </ac:picMkLst>
-        </pc:picChg>
-      </pc:sldChg>
-      <pc:sldChg chg="addSp modSp new mod">
-        <pc:chgData name="Geoff Butcher" userId="1cb31d20-838c-4d88-81d0-dc1a78ccb326" providerId="ADAL" clId="{A42B9E86-A0DE-4982-A141-66AF500C2B3B}" dt="2021-02-07T19:42:43.116" v="2899" actId="1582"/>
-        <pc:sldMkLst>
-          <pc:docMk/>
-          <pc:sldMk cId="26861849" sldId="282"/>
-        </pc:sldMkLst>
-        <pc:spChg chg="mod">
-          <ac:chgData name="Geoff Butcher" userId="1cb31d20-838c-4d88-81d0-dc1a78ccb326" providerId="ADAL" clId="{A42B9E86-A0DE-4982-A141-66AF500C2B3B}" dt="2021-02-07T19:39:17.622" v="2457" actId="20577"/>
-          <ac:spMkLst>
-            <pc:docMk/>
-            <pc:sldMk cId="26861849" sldId="282"/>
-            <ac:spMk id="2" creationId="{D096A4EE-A0BC-4F03-8E25-18D6A161084C}"/>
-          </ac:spMkLst>
-        </pc:spChg>
-        <pc:spChg chg="mod">
-          <ac:chgData name="Geoff Butcher" userId="1cb31d20-838c-4d88-81d0-dc1a78ccb326" providerId="ADAL" clId="{A42B9E86-A0DE-4982-A141-66AF500C2B3B}" dt="2021-02-07T19:41:44.471" v="2885" actId="20577"/>
-          <ac:spMkLst>
-            <pc:docMk/>
-            <pc:sldMk cId="26861849" sldId="282"/>
-            <ac:spMk id="3" creationId="{B4C3BC92-CF5A-49E9-86E4-1D6C7E99809A}"/>
-          </ac:spMkLst>
-        </pc:spChg>
-        <pc:spChg chg="add mod">
-          <ac:chgData name="Geoff Butcher" userId="1cb31d20-838c-4d88-81d0-dc1a78ccb326" providerId="ADAL" clId="{A42B9E86-A0DE-4982-A141-66AF500C2B3B}" dt="2021-02-07T19:42:43.116" v="2899" actId="1582"/>
-          <ac:spMkLst>
-            <pc:docMk/>
-            <pc:sldMk cId="26861849" sldId="282"/>
-            <ac:spMk id="7" creationId="{68B2CD1C-3720-4729-B310-51AD33989F6A}"/>
-          </ac:spMkLst>
-        </pc:spChg>
-        <pc:picChg chg="add mod">
-          <ac:chgData name="Geoff Butcher" userId="1cb31d20-838c-4d88-81d0-dc1a78ccb326" providerId="ADAL" clId="{A42B9E86-A0DE-4982-A141-66AF500C2B3B}" dt="2021-02-07T19:42:04.364" v="2886" actId="1076"/>
-          <ac:picMkLst>
-            <pc:docMk/>
-            <pc:sldMk cId="26861849" sldId="282"/>
-            <ac:picMk id="5" creationId="{6B8F32DC-3F08-43AE-9DC8-C4859617BBBB}"/>
-          </ac:picMkLst>
-        </pc:picChg>
-        <pc:picChg chg="add mod modCrop">
-          <ac:chgData name="Geoff Butcher" userId="1cb31d20-838c-4d88-81d0-dc1a78ccb326" providerId="ADAL" clId="{A42B9E86-A0DE-4982-A141-66AF500C2B3B}" dt="2021-02-07T19:42:28.548" v="2895" actId="1076"/>
-          <ac:picMkLst>
-            <pc:docMk/>
-            <pc:sldMk cId="26861849" sldId="282"/>
-            <ac:picMk id="6" creationId="{ACA5563D-75F4-43AF-92A6-51DDF0F67594}"/>
-          </ac:picMkLst>
-        </pc:picChg>
-      </pc:sldChg>
-      <pc:sldChg chg="addSp modSp new mod">
-        <pc:chgData name="Geoff Butcher" userId="1cb31d20-838c-4d88-81d0-dc1a78ccb326" providerId="ADAL" clId="{A42B9E86-A0DE-4982-A141-66AF500C2B3B}" dt="2021-02-08T12:18:24.525" v="7624" actId="1076"/>
-        <pc:sldMkLst>
-          <pc:docMk/>
-          <pc:sldMk cId="1836482924" sldId="283"/>
-        </pc:sldMkLst>
-        <pc:spChg chg="mod">
-          <ac:chgData name="Geoff Butcher" userId="1cb31d20-838c-4d88-81d0-dc1a78ccb326" providerId="ADAL" clId="{A42B9E86-A0DE-4982-A141-66AF500C2B3B}" dt="2021-02-07T19:37:23.281" v="2183" actId="20577"/>
-          <ac:spMkLst>
-            <pc:docMk/>
-            <pc:sldMk cId="1836482924" sldId="283"/>
-            <ac:spMk id="2" creationId="{417B3C36-7DFC-4F17-9B2D-797B93A85716}"/>
-          </ac:spMkLst>
-        </pc:spChg>
-        <pc:spChg chg="mod">
-          <ac:chgData name="Geoff Butcher" userId="1cb31d20-838c-4d88-81d0-dc1a78ccb326" providerId="ADAL" clId="{A42B9E86-A0DE-4982-A141-66AF500C2B3B}" dt="2021-02-07T19:38:56.327" v="2418" actId="20577"/>
-          <ac:spMkLst>
-            <pc:docMk/>
-            <pc:sldMk cId="1836482924" sldId="283"/>
-            <ac:spMk id="3" creationId="{7FD71824-7BE7-4168-8C8D-1FC19362F6D6}"/>
-          </ac:spMkLst>
-        </pc:spChg>
-        <pc:picChg chg="add mod">
-          <ac:chgData name="Geoff Butcher" userId="1cb31d20-838c-4d88-81d0-dc1a78ccb326" providerId="ADAL" clId="{A42B9E86-A0DE-4982-A141-66AF500C2B3B}" dt="2021-02-08T12:18:24.525" v="7624" actId="1076"/>
-          <ac:picMkLst>
-            <pc:docMk/>
-            <pc:sldMk cId="1836482924" sldId="283"/>
-            <ac:picMk id="4" creationId="{EA23B843-211F-4A7F-AFC2-21B22B0D76FA}"/>
-          </ac:picMkLst>
-        </pc:picChg>
-      </pc:sldChg>
-      <pc:sldChg chg="addSp modSp new mod">
-        <pc:chgData name="Geoff Butcher" userId="1cb31d20-838c-4d88-81d0-dc1a78ccb326" providerId="ADAL" clId="{A42B9E86-A0DE-4982-A141-66AF500C2B3B}" dt="2021-02-07T19:45:14.874" v="3172" actId="14100"/>
-        <pc:sldMkLst>
-          <pc:docMk/>
-          <pc:sldMk cId="295329404" sldId="284"/>
-        </pc:sldMkLst>
-        <pc:spChg chg="mod">
-          <ac:chgData name="Geoff Butcher" userId="1cb31d20-838c-4d88-81d0-dc1a78ccb326" providerId="ADAL" clId="{A42B9E86-A0DE-4982-A141-66AF500C2B3B}" dt="2021-02-07T19:42:55.771" v="2911" actId="20577"/>
-          <ac:spMkLst>
-            <pc:docMk/>
-            <pc:sldMk cId="295329404" sldId="284"/>
-            <ac:spMk id="2" creationId="{115AA3D3-72DB-4D83-8178-E999A2867E71}"/>
-          </ac:spMkLst>
-        </pc:spChg>
-        <pc:spChg chg="mod">
-          <ac:chgData name="Geoff Butcher" userId="1cb31d20-838c-4d88-81d0-dc1a78ccb326" providerId="ADAL" clId="{A42B9E86-A0DE-4982-A141-66AF500C2B3B}" dt="2021-02-07T19:45:14.874" v="3172" actId="14100"/>
-          <ac:spMkLst>
-            <pc:docMk/>
-            <pc:sldMk cId="295329404" sldId="284"/>
-            <ac:spMk id="3" creationId="{C2B84226-957B-4002-BCAC-7B9B311EAD2C}"/>
-          </ac:spMkLst>
-        </pc:spChg>
-        <pc:picChg chg="add mod">
-          <ac:chgData name="Geoff Butcher" userId="1cb31d20-838c-4d88-81d0-dc1a78ccb326" providerId="ADAL" clId="{A42B9E86-A0DE-4982-A141-66AF500C2B3B}" dt="2021-02-07T19:43:45.536" v="2918" actId="27614"/>
-          <ac:picMkLst>
-            <pc:docMk/>
-            <pc:sldMk cId="295329404" sldId="284"/>
-            <ac:picMk id="5" creationId="{881F3A44-3D96-4BF8-B229-8D0DE04D9060}"/>
-          </ac:picMkLst>
-        </pc:picChg>
-      </pc:sldChg>
-      <pc:sldChg chg="addSp modSp add mod">
-        <pc:chgData name="Geoff Butcher" userId="1cb31d20-838c-4d88-81d0-dc1a78ccb326" providerId="ADAL" clId="{A42B9E86-A0DE-4982-A141-66AF500C2B3B}" dt="2021-02-07T19:49:36.859" v="3647" actId="14100"/>
-        <pc:sldMkLst>
-          <pc:docMk/>
-          <pc:sldMk cId="3301953182" sldId="285"/>
-        </pc:sldMkLst>
-        <pc:spChg chg="mod">
-          <ac:chgData name="Geoff Butcher" userId="1cb31d20-838c-4d88-81d0-dc1a78ccb326" providerId="ADAL" clId="{A42B9E86-A0DE-4982-A141-66AF500C2B3B}" dt="2021-02-07T19:47:06.855" v="3500" actId="20577"/>
-          <ac:spMkLst>
-            <pc:docMk/>
-            <pc:sldMk cId="3301953182" sldId="285"/>
-            <ac:spMk id="3" creationId="{C2B84226-957B-4002-BCAC-7B9B311EAD2C}"/>
-          </ac:spMkLst>
-        </pc:spChg>
-        <pc:spChg chg="add mod">
-          <ac:chgData name="Geoff Butcher" userId="1cb31d20-838c-4d88-81d0-dc1a78ccb326" providerId="ADAL" clId="{A42B9E86-A0DE-4982-A141-66AF500C2B3B}" dt="2021-02-07T19:49:10.727" v="3643" actId="208"/>
-          <ac:spMkLst>
-            <pc:docMk/>
-            <pc:sldMk cId="3301953182" sldId="285"/>
-            <ac:spMk id="4" creationId="{9BA327F6-F8E4-4AAC-9C66-41992EEFFFD5}"/>
-          </ac:spMkLst>
-        </pc:spChg>
-        <pc:spChg chg="add mod">
-          <ac:chgData name="Geoff Butcher" userId="1cb31d20-838c-4d88-81d0-dc1a78ccb326" providerId="ADAL" clId="{A42B9E86-A0DE-4982-A141-66AF500C2B3B}" dt="2021-02-07T19:48:59.977" v="3641" actId="208"/>
-          <ac:spMkLst>
-            <pc:docMk/>
-            <pc:sldMk cId="3301953182" sldId="285"/>
-            <ac:spMk id="9" creationId="{BD25DE61-E67B-42BC-A5CC-52521F07963C}"/>
-          </ac:spMkLst>
-        </pc:spChg>
-        <pc:picChg chg="mod modCrop">
-          <ac:chgData name="Geoff Butcher" userId="1cb31d20-838c-4d88-81d0-dc1a78ccb326" providerId="ADAL" clId="{A42B9E86-A0DE-4982-A141-66AF500C2B3B}" dt="2021-02-07T19:47:17.352" v="3501" actId="1076"/>
-          <ac:picMkLst>
-            <pc:docMk/>
-            <pc:sldMk cId="3301953182" sldId="285"/>
-            <ac:picMk id="5" creationId="{881F3A44-3D96-4BF8-B229-8D0DE04D9060}"/>
-          </ac:picMkLst>
-        </pc:picChg>
-        <pc:cxnChg chg="add mod">
-          <ac:chgData name="Geoff Butcher" userId="1cb31d20-838c-4d88-81d0-dc1a78ccb326" providerId="ADAL" clId="{A42B9E86-A0DE-4982-A141-66AF500C2B3B}" dt="2021-02-07T19:49:34.374" v="3646" actId="14100"/>
-          <ac:cxnSpMkLst>
-            <pc:docMk/>
-            <pc:sldMk cId="3301953182" sldId="285"/>
-            <ac:cxnSpMk id="7" creationId="{499AE502-BB78-4EDB-8608-E87CFEC79845}"/>
-          </ac:cxnSpMkLst>
-        </pc:cxnChg>
-        <pc:cxnChg chg="add mod">
-          <ac:chgData name="Geoff Butcher" userId="1cb31d20-838c-4d88-81d0-dc1a78ccb326" providerId="ADAL" clId="{A42B9E86-A0DE-4982-A141-66AF500C2B3B}" dt="2021-02-07T19:49:36.859" v="3647" actId="14100"/>
-          <ac:cxnSpMkLst>
-            <pc:docMk/>
-            <pc:sldMk cId="3301953182" sldId="285"/>
-            <ac:cxnSpMk id="11" creationId="{32861A94-D2E0-4DA4-A252-446A14679099}"/>
-          </ac:cxnSpMkLst>
-        </pc:cxnChg>
-      </pc:sldChg>
-      <pc:sldChg chg="addSp delSp modSp new mod">
-        <pc:chgData name="Geoff Butcher" userId="1cb31d20-838c-4d88-81d0-dc1a78ccb326" providerId="ADAL" clId="{A42B9E86-A0DE-4982-A141-66AF500C2B3B}" dt="2021-02-07T19:57:56.229" v="4344" actId="20577"/>
-        <pc:sldMkLst>
-          <pc:docMk/>
-          <pc:sldMk cId="3429103600" sldId="286"/>
-        </pc:sldMkLst>
-        <pc:spChg chg="mod">
-          <ac:chgData name="Geoff Butcher" userId="1cb31d20-838c-4d88-81d0-dc1a78ccb326" providerId="ADAL" clId="{A42B9E86-A0DE-4982-A141-66AF500C2B3B}" dt="2021-02-07T19:53:27.653" v="3842" actId="1076"/>
-          <ac:spMkLst>
-            <pc:docMk/>
-            <pc:sldMk cId="3429103600" sldId="286"/>
-            <ac:spMk id="2" creationId="{F00AA77D-B316-439C-B04D-965466209CF9}"/>
-          </ac:spMkLst>
-        </pc:spChg>
-        <pc:spChg chg="del">
-          <ac:chgData name="Geoff Butcher" userId="1cb31d20-838c-4d88-81d0-dc1a78ccb326" providerId="ADAL" clId="{A42B9E86-A0DE-4982-A141-66AF500C2B3B}" dt="2021-02-07T19:50:04.486" v="3662" actId="478"/>
-          <ac:spMkLst>
-            <pc:docMk/>
-            <pc:sldMk cId="3429103600" sldId="286"/>
-            <ac:spMk id="3" creationId="{CDC41527-56D9-4A6D-98CD-9D8ABE78FD26}"/>
-          </ac:spMkLst>
-        </pc:spChg>
-        <pc:spChg chg="add del mod">
-          <ac:chgData name="Geoff Butcher" userId="1cb31d20-838c-4d88-81d0-dc1a78ccb326" providerId="ADAL" clId="{A42B9E86-A0DE-4982-A141-66AF500C2B3B}" dt="2021-02-07T19:53:31.601" v="3843" actId="21"/>
-          <ac:spMkLst>
-            <pc:docMk/>
-            <pc:sldMk cId="3429103600" sldId="286"/>
-            <ac:spMk id="4" creationId="{6C151E39-505F-4EE6-BA7F-D69F573EEB4B}"/>
-          </ac:spMkLst>
-        </pc:spChg>
-        <pc:spChg chg="add del mod">
-          <ac:chgData name="Geoff Butcher" userId="1cb31d20-838c-4d88-81d0-dc1a78ccb326" providerId="ADAL" clId="{A42B9E86-A0DE-4982-A141-66AF500C2B3B}" dt="2021-02-07T19:50:42.660" v="3671"/>
-          <ac:spMkLst>
-            <pc:docMk/>
-            <pc:sldMk cId="3429103600" sldId="286"/>
-            <ac:spMk id="7" creationId="{01B53A98-6904-447F-A436-1B03DAAC9CAB}"/>
-          </ac:spMkLst>
-        </pc:spChg>
-        <pc:spChg chg="add del mod">
-          <ac:chgData name="Geoff Butcher" userId="1cb31d20-838c-4d88-81d0-dc1a78ccb326" providerId="ADAL" clId="{A42B9E86-A0DE-4982-A141-66AF500C2B3B}" dt="2021-02-07T19:53:31.601" v="3843" actId="21"/>
-          <ac:spMkLst>
-            <pc:docMk/>
-            <pc:sldMk cId="3429103600" sldId="286"/>
-            <ac:spMk id="11" creationId="{1DEE2647-44D1-4F97-A43B-E9A029B76C14}"/>
-          </ac:spMkLst>
-        </pc:spChg>
-        <pc:spChg chg="add del mod">
-          <ac:chgData name="Geoff Butcher" userId="1cb31d20-838c-4d88-81d0-dc1a78ccb326" providerId="ADAL" clId="{A42B9E86-A0DE-4982-A141-66AF500C2B3B}" dt="2021-02-07T19:53:31.601" v="3843" actId="21"/>
-          <ac:spMkLst>
-            <pc:docMk/>
-            <pc:sldMk cId="3429103600" sldId="286"/>
-            <ac:spMk id="12" creationId="{A3166B5A-6BDE-4353-AD34-37F197D5B2C5}"/>
-          </ac:spMkLst>
-        </pc:spChg>
-        <pc:spChg chg="add del mod">
-          <ac:chgData name="Geoff Butcher" userId="1cb31d20-838c-4d88-81d0-dc1a78ccb326" providerId="ADAL" clId="{A42B9E86-A0DE-4982-A141-66AF500C2B3B}" dt="2021-02-07T19:53:31.601" v="3843" actId="21"/>
-          <ac:spMkLst>
-            <pc:docMk/>
-            <pc:sldMk cId="3429103600" sldId="286"/>
-            <ac:spMk id="13" creationId="{11E62950-1495-4B4A-B2BB-5E68D72BEB8A}"/>
-          </ac:spMkLst>
-        </pc:spChg>
-        <pc:spChg chg="add del mod">
-          <ac:chgData name="Geoff Butcher" userId="1cb31d20-838c-4d88-81d0-dc1a78ccb326" providerId="ADAL" clId="{A42B9E86-A0DE-4982-A141-66AF500C2B3B}" dt="2021-02-07T19:53:31.601" v="3843" actId="21"/>
-          <ac:spMkLst>
-            <pc:docMk/>
-            <pc:sldMk cId="3429103600" sldId="286"/>
-            <ac:spMk id="14" creationId="{E96CFDFA-B08E-43FC-8DCD-7AFF2FD3E3EA}"/>
-          </ac:spMkLst>
-        </pc:spChg>
-        <pc:spChg chg="add del mod">
-          <ac:chgData name="Geoff Butcher" userId="1cb31d20-838c-4d88-81d0-dc1a78ccb326" providerId="ADAL" clId="{A42B9E86-A0DE-4982-A141-66AF500C2B3B}" dt="2021-02-07T19:53:31.601" v="3843" actId="21"/>
-          <ac:spMkLst>
-            <pc:docMk/>
-            <pc:sldMk cId="3429103600" sldId="286"/>
-            <ac:spMk id="15" creationId="{8170A232-F64F-42AA-B312-34902260F9DB}"/>
-          </ac:spMkLst>
-        </pc:spChg>
-        <pc:spChg chg="add mod">
-          <ac:chgData name="Geoff Butcher" userId="1cb31d20-838c-4d88-81d0-dc1a78ccb326" providerId="ADAL" clId="{A42B9E86-A0DE-4982-A141-66AF500C2B3B}" dt="2021-02-07T19:57:56.229" v="4344" actId="20577"/>
-          <ac:spMkLst>
-            <pc:docMk/>
-            <pc:sldMk cId="3429103600" sldId="286"/>
-            <ac:spMk id="17" creationId="{604C30FB-07B1-4DFB-ADD1-42E21E2E8199}"/>
-          </ac:spMkLst>
-        </pc:spChg>
-        <pc:picChg chg="add mod">
-          <ac:chgData name="Geoff Butcher" userId="1cb31d20-838c-4d88-81d0-dc1a78ccb326" providerId="ADAL" clId="{A42B9E86-A0DE-4982-A141-66AF500C2B3B}" dt="2021-02-07T19:53:43.695" v="3851" actId="1076"/>
-          <ac:picMkLst>
-            <pc:docMk/>
-            <pc:sldMk cId="3429103600" sldId="286"/>
-            <ac:picMk id="16" creationId="{1A23E5EB-2DE7-44FB-8478-EF4E29F73EBC}"/>
-          </ac:picMkLst>
-        </pc:picChg>
-        <pc:cxnChg chg="add del mod">
-          <ac:chgData name="Geoff Butcher" userId="1cb31d20-838c-4d88-81d0-dc1a78ccb326" providerId="ADAL" clId="{A42B9E86-A0DE-4982-A141-66AF500C2B3B}" dt="2021-02-07T19:53:31.601" v="3843" actId="21"/>
-          <ac:cxnSpMkLst>
-            <pc:docMk/>
-            <pc:sldMk cId="3429103600" sldId="286"/>
-            <ac:cxnSpMk id="6" creationId="{B386A81A-40AF-4675-80E2-02B12AB385B3}"/>
-          </ac:cxnSpMkLst>
-        </pc:cxnChg>
-        <pc:cxnChg chg="add del mod">
-          <ac:chgData name="Geoff Butcher" userId="1cb31d20-838c-4d88-81d0-dc1a78ccb326" providerId="ADAL" clId="{A42B9E86-A0DE-4982-A141-66AF500C2B3B}" dt="2021-02-07T19:53:31.601" v="3843" actId="21"/>
-          <ac:cxnSpMkLst>
-            <pc:docMk/>
-            <pc:sldMk cId="3429103600" sldId="286"/>
-            <ac:cxnSpMk id="8" creationId="{2491A057-6FA2-45B8-96C6-129EC500723A}"/>
-          </ac:cxnSpMkLst>
-        </pc:cxnChg>
-      </pc:sldChg>
-      <pc:sldChg chg="addSp delSp modSp new mod">
-        <pc:chgData name="Geoff Butcher" userId="1cb31d20-838c-4d88-81d0-dc1a78ccb326" providerId="ADAL" clId="{A42B9E86-A0DE-4982-A141-66AF500C2B3B}" dt="2021-02-07T19:56:00.524" v="3951" actId="207"/>
-        <pc:sldMkLst>
-          <pc:docMk/>
-          <pc:sldMk cId="503030251" sldId="287"/>
-        </pc:sldMkLst>
-        <pc:spChg chg="mod">
-          <ac:chgData name="Geoff Butcher" userId="1cb31d20-838c-4d88-81d0-dc1a78ccb326" providerId="ADAL" clId="{A42B9E86-A0DE-4982-A141-66AF500C2B3B}" dt="2021-02-07T19:52:59.090" v="3739" actId="20577"/>
-          <ac:spMkLst>
-            <pc:docMk/>
-            <pc:sldMk cId="503030251" sldId="287"/>
-            <ac:spMk id="2" creationId="{33E434F9-CD5D-4775-A445-ED79937F8CBD}"/>
-          </ac:spMkLst>
-        </pc:spChg>
-        <pc:spChg chg="mod">
-          <ac:chgData name="Geoff Butcher" userId="1cb31d20-838c-4d88-81d0-dc1a78ccb326" providerId="ADAL" clId="{A42B9E86-A0DE-4982-A141-66AF500C2B3B}" dt="2021-02-07T19:56:00.524" v="3951" actId="207"/>
-          <ac:spMkLst>
-            <pc:docMk/>
-            <pc:sldMk cId="503030251" sldId="287"/>
-            <ac:spMk id="3" creationId="{BF572ACE-7BA7-4E8A-9D43-DE04D42FDF36}"/>
-          </ac:spMkLst>
-        </pc:spChg>
-        <pc:spChg chg="add mod">
-          <ac:chgData name="Geoff Butcher" userId="1cb31d20-838c-4d88-81d0-dc1a78ccb326" providerId="ADAL" clId="{A42B9E86-A0DE-4982-A141-66AF500C2B3B}" dt="2021-02-07T19:53:52.921" v="3853" actId="1076"/>
-          <ac:spMkLst>
-            <pc:docMk/>
-            <pc:sldMk cId="503030251" sldId="287"/>
-            <ac:spMk id="4" creationId="{55539BBC-D941-482C-A666-6BFEFCB54620}"/>
-          </ac:spMkLst>
-        </pc:spChg>
-        <pc:spChg chg="add mod">
-          <ac:chgData name="Geoff Butcher" userId="1cb31d20-838c-4d88-81d0-dc1a78ccb326" providerId="ADAL" clId="{A42B9E86-A0DE-4982-A141-66AF500C2B3B}" dt="2021-02-07T19:54:56.750" v="3873" actId="1076"/>
-          <ac:spMkLst>
-            <pc:docMk/>
-            <pc:sldMk cId="503030251" sldId="287"/>
-            <ac:spMk id="8" creationId="{364183DB-FC4B-4FC3-9A20-259D91D7371D}"/>
-          </ac:spMkLst>
-        </pc:spChg>
-        <pc:spChg chg="add del mod">
-          <ac:chgData name="Geoff Butcher" userId="1cb31d20-838c-4d88-81d0-dc1a78ccb326" providerId="ADAL" clId="{A42B9E86-A0DE-4982-A141-66AF500C2B3B}" dt="2021-02-07T19:55:09.519" v="3876"/>
-          <ac:spMkLst>
-            <pc:docMk/>
-            <pc:sldMk cId="503030251" sldId="287"/>
-            <ac:spMk id="9" creationId="{BFE4EC91-685F-4566-ADA5-0E9EDF022AFB}"/>
-          </ac:spMkLst>
-        </pc:spChg>
-        <pc:spChg chg="add mod">
-          <ac:chgData name="Geoff Butcher" userId="1cb31d20-838c-4d88-81d0-dc1a78ccb326" providerId="ADAL" clId="{A42B9E86-A0DE-4982-A141-66AF500C2B3B}" dt="2021-02-07T19:55:20.683" v="3887" actId="20577"/>
-          <ac:spMkLst>
-            <pc:docMk/>
-            <pc:sldMk cId="503030251" sldId="287"/>
-            <ac:spMk id="10" creationId="{77BE3C8E-B078-43DB-BD52-F3C5AFB91E12}"/>
-          </ac:spMkLst>
-        </pc:spChg>
-        <pc:cxnChg chg="add mod">
-          <ac:chgData name="Geoff Butcher" userId="1cb31d20-838c-4d88-81d0-dc1a78ccb326" providerId="ADAL" clId="{A42B9E86-A0DE-4982-A141-66AF500C2B3B}" dt="2021-02-07T19:54:44.350" v="3867" actId="14100"/>
-          <ac:cxnSpMkLst>
-            <pc:docMk/>
-            <pc:sldMk cId="503030251" sldId="287"/>
-            <ac:cxnSpMk id="6" creationId="{3BB16819-9F98-4819-AB58-9099D3BD8FE3}"/>
-          </ac:cxnSpMkLst>
-        </pc:cxnChg>
-      </pc:sldChg>
-      <pc:sldChg chg="addSp delSp modSp new mod">
-        <pc:chgData name="Geoff Butcher" userId="1cb31d20-838c-4d88-81d0-dc1a78ccb326" providerId="ADAL" clId="{A42B9E86-A0DE-4982-A141-66AF500C2B3B}" dt="2021-02-08T11:58:43.777" v="5805" actId="20577"/>
-        <pc:sldMkLst>
-          <pc:docMk/>
-          <pc:sldMk cId="1452426237" sldId="288"/>
-        </pc:sldMkLst>
-        <pc:spChg chg="mod">
-          <ac:chgData name="Geoff Butcher" userId="1cb31d20-838c-4d88-81d0-dc1a78ccb326" providerId="ADAL" clId="{A42B9E86-A0DE-4982-A141-66AF500C2B3B}" dt="2021-02-08T08:36:23.652" v="4353" actId="20577"/>
-          <ac:spMkLst>
-            <pc:docMk/>
-            <pc:sldMk cId="1452426237" sldId="288"/>
-            <ac:spMk id="2" creationId="{E9435C31-71A7-4FEE-8599-05BEEEF82C41}"/>
-          </ac:spMkLst>
-        </pc:spChg>
-        <pc:spChg chg="mod">
-          <ac:chgData name="Geoff Butcher" userId="1cb31d20-838c-4d88-81d0-dc1a78ccb326" providerId="ADAL" clId="{A42B9E86-A0DE-4982-A141-66AF500C2B3B}" dt="2021-02-08T11:57:42.325" v="5682" actId="207"/>
-          <ac:spMkLst>
-            <pc:docMk/>
-            <pc:sldMk cId="1452426237" sldId="288"/>
-            <ac:spMk id="3" creationId="{A4E53686-6F6E-44D9-A63E-49937C384A92}"/>
-          </ac:spMkLst>
-        </pc:spChg>
-        <pc:spChg chg="add mod">
-          <ac:chgData name="Geoff Butcher" userId="1cb31d20-838c-4d88-81d0-dc1a78ccb326" providerId="ADAL" clId="{A42B9E86-A0DE-4982-A141-66AF500C2B3B}" dt="2021-02-08T11:58:43.777" v="5805" actId="20577"/>
-          <ac:spMkLst>
-            <pc:docMk/>
-            <pc:sldMk cId="1452426237" sldId="288"/>
-            <ac:spMk id="8" creationId="{DA72F87D-2204-43D0-827F-CEDBA9C15A4F}"/>
-          </ac:spMkLst>
-        </pc:spChg>
-        <pc:picChg chg="add del mod">
-          <ac:chgData name="Geoff Butcher" userId="1cb31d20-838c-4d88-81d0-dc1a78ccb326" providerId="ADAL" clId="{A42B9E86-A0DE-4982-A141-66AF500C2B3B}" dt="2021-02-08T11:55:34.914" v="5386" actId="478"/>
-          <ac:picMkLst>
-            <pc:docMk/>
-            <pc:sldMk cId="1452426237" sldId="288"/>
-            <ac:picMk id="5" creationId="{191CB9DA-6618-4C45-9771-02A4EE0F3619}"/>
-          </ac:picMkLst>
-        </pc:picChg>
-        <pc:picChg chg="add mod">
-          <ac:chgData name="Geoff Butcher" userId="1cb31d20-838c-4d88-81d0-dc1a78ccb326" providerId="ADAL" clId="{A42B9E86-A0DE-4982-A141-66AF500C2B3B}" dt="2021-02-08T11:56:08.847" v="5393" actId="1076"/>
-          <ac:picMkLst>
-            <pc:docMk/>
-            <pc:sldMk cId="1452426237" sldId="288"/>
-            <ac:picMk id="7" creationId="{1412C712-37D6-4049-878F-EFCFCB4B8F0A}"/>
-          </ac:picMkLst>
-        </pc:picChg>
-      </pc:sldChg>
-      <pc:sldChg chg="addSp modSp new mod">
-        <pc:chgData name="Geoff Butcher" userId="1cb31d20-838c-4d88-81d0-dc1a78ccb326" providerId="ADAL" clId="{A42B9E86-A0DE-4982-A141-66AF500C2B3B}" dt="2021-02-08T09:12:21.374" v="5270" actId="20577"/>
-        <pc:sldMkLst>
-          <pc:docMk/>
-          <pc:sldMk cId="4262674240" sldId="289"/>
-        </pc:sldMkLst>
-        <pc:spChg chg="mod">
-          <ac:chgData name="Geoff Butcher" userId="1cb31d20-838c-4d88-81d0-dc1a78ccb326" providerId="ADAL" clId="{A42B9E86-A0DE-4982-A141-66AF500C2B3B}" dt="2021-02-08T08:38:57.718" v="4515" actId="20577"/>
-          <ac:spMkLst>
-            <pc:docMk/>
-            <pc:sldMk cId="4262674240" sldId="289"/>
-            <ac:spMk id="2" creationId="{B27589A1-B194-4BC4-984D-2F592A74AB82}"/>
-          </ac:spMkLst>
-        </pc:spChg>
-        <pc:spChg chg="mod">
-          <ac:chgData name="Geoff Butcher" userId="1cb31d20-838c-4d88-81d0-dc1a78ccb326" providerId="ADAL" clId="{A42B9E86-A0DE-4982-A141-66AF500C2B3B}" dt="2021-02-08T09:12:21.374" v="5270" actId="20577"/>
-          <ac:spMkLst>
-            <pc:docMk/>
-            <pc:sldMk cId="4262674240" sldId="289"/>
-            <ac:spMk id="3" creationId="{3C38CDB4-E66A-4A02-8A0A-FED12B13B878}"/>
-          </ac:spMkLst>
-        </pc:spChg>
-        <pc:picChg chg="add mod">
-          <ac:chgData name="Geoff Butcher" userId="1cb31d20-838c-4d88-81d0-dc1a78ccb326" providerId="ADAL" clId="{A42B9E86-A0DE-4982-A141-66AF500C2B3B}" dt="2021-02-08T08:39:44.288" v="4604" actId="1076"/>
-          <ac:picMkLst>
-            <pc:docMk/>
-            <pc:sldMk cId="4262674240" sldId="289"/>
-            <ac:picMk id="5" creationId="{4A33B21B-479D-40C3-A85E-DC8865AEA221}"/>
-          </ac:picMkLst>
-        </pc:picChg>
-      </pc:sldChg>
-      <pc:sldChg chg="addSp modSp new mod ord">
-        <pc:chgData name="Geoff Butcher" userId="1cb31d20-838c-4d88-81d0-dc1a78ccb326" providerId="ADAL" clId="{A42B9E86-A0DE-4982-A141-66AF500C2B3B}" dt="2021-02-08T09:11:00.024" v="5176" actId="207"/>
-        <pc:sldMkLst>
-          <pc:docMk/>
-          <pc:sldMk cId="69138350" sldId="290"/>
-        </pc:sldMkLst>
-        <pc:spChg chg="mod">
-          <ac:chgData name="Geoff Butcher" userId="1cb31d20-838c-4d88-81d0-dc1a78ccb326" providerId="ADAL" clId="{A42B9E86-A0DE-4982-A141-66AF500C2B3B}" dt="2021-02-08T08:40:18.847" v="4686" actId="20577"/>
-          <ac:spMkLst>
-            <pc:docMk/>
-            <pc:sldMk cId="69138350" sldId="290"/>
-            <ac:spMk id="2" creationId="{4B788D8F-E640-44EE-9B28-2C47CF2C2E9F}"/>
-          </ac:spMkLst>
-        </pc:spChg>
-        <pc:spChg chg="mod">
-          <ac:chgData name="Geoff Butcher" userId="1cb31d20-838c-4d88-81d0-dc1a78ccb326" providerId="ADAL" clId="{A42B9E86-A0DE-4982-A141-66AF500C2B3B}" dt="2021-02-08T09:11:00.024" v="5176" actId="207"/>
-          <ac:spMkLst>
-            <pc:docMk/>
-            <pc:sldMk cId="69138350" sldId="290"/>
-            <ac:spMk id="3" creationId="{D1985B59-5E64-4229-B564-9C11982DA13C}"/>
-          </ac:spMkLst>
-        </pc:spChg>
-        <pc:picChg chg="add mod">
-          <ac:chgData name="Geoff Butcher" userId="1cb31d20-838c-4d88-81d0-dc1a78ccb326" providerId="ADAL" clId="{A42B9E86-A0DE-4982-A141-66AF500C2B3B}" dt="2021-02-08T09:09:45.746" v="4912" actId="1076"/>
-          <ac:picMkLst>
-            <pc:docMk/>
-            <pc:sldMk cId="69138350" sldId="290"/>
-            <ac:picMk id="5" creationId="{20FC64F6-5B3B-4078-8250-52449BBD0AE9}"/>
-          </ac:picMkLst>
-        </pc:picChg>
-      </pc:sldChg>
-      <pc:sldChg chg="addSp modSp new mod">
-        <pc:chgData name="Geoff Butcher" userId="1cb31d20-838c-4d88-81d0-dc1a78ccb326" providerId="ADAL" clId="{A42B9E86-A0DE-4982-A141-66AF500C2B3B}" dt="2021-02-08T09:14:07.916" v="5383" actId="20577"/>
-        <pc:sldMkLst>
-          <pc:docMk/>
-          <pc:sldMk cId="2118186357" sldId="291"/>
-        </pc:sldMkLst>
-        <pc:spChg chg="mod">
-          <ac:chgData name="Geoff Butcher" userId="1cb31d20-838c-4d88-81d0-dc1a78ccb326" providerId="ADAL" clId="{A42B9E86-A0DE-4982-A141-66AF500C2B3B}" dt="2021-02-08T09:12:29.734" v="5283" actId="20577"/>
-          <ac:spMkLst>
-            <pc:docMk/>
-            <pc:sldMk cId="2118186357" sldId="291"/>
-            <ac:spMk id="2" creationId="{889B934A-5510-4728-9B5A-778E807AB89C}"/>
-          </ac:spMkLst>
-        </pc:spChg>
-        <pc:spChg chg="mod">
-          <ac:chgData name="Geoff Butcher" userId="1cb31d20-838c-4d88-81d0-dc1a78ccb326" providerId="ADAL" clId="{A42B9E86-A0DE-4982-A141-66AF500C2B3B}" dt="2021-02-08T09:14:07.916" v="5383" actId="20577"/>
-          <ac:spMkLst>
-            <pc:docMk/>
-            <pc:sldMk cId="2118186357" sldId="291"/>
-            <ac:spMk id="3" creationId="{73A57BF7-1B11-413C-9473-4DFCD88D9E1B}"/>
-          </ac:spMkLst>
-        </pc:spChg>
-        <pc:picChg chg="add mod">
-          <ac:chgData name="Geoff Butcher" userId="1cb31d20-838c-4d88-81d0-dc1a78ccb326" providerId="ADAL" clId="{A42B9E86-A0DE-4982-A141-66AF500C2B3B}" dt="2021-02-08T09:13:22.858" v="5293" actId="27614"/>
-          <ac:picMkLst>
-            <pc:docMk/>
-            <pc:sldMk cId="2118186357" sldId="291"/>
-            <ac:picMk id="5" creationId="{61103B89-2244-45F0-95EB-9847A93D83D5}"/>
-          </ac:picMkLst>
-        </pc:picChg>
-      </pc:sldChg>
-      <pc:sldChg chg="addSp modSp new mod">
-        <pc:chgData name="Geoff Butcher" userId="1cb31d20-838c-4d88-81d0-dc1a78ccb326" providerId="ADAL" clId="{A42B9E86-A0DE-4982-A141-66AF500C2B3B}" dt="2021-02-08T12:02:15.302" v="6181" actId="20577"/>
-        <pc:sldMkLst>
-          <pc:docMk/>
-          <pc:sldMk cId="469602028" sldId="292"/>
-        </pc:sldMkLst>
-        <pc:spChg chg="mod">
-          <ac:chgData name="Geoff Butcher" userId="1cb31d20-838c-4d88-81d0-dc1a78ccb326" providerId="ADAL" clId="{A42B9E86-A0DE-4982-A141-66AF500C2B3B}" dt="2021-02-08T11:59:05.686" v="5830" actId="20577"/>
-          <ac:spMkLst>
-            <pc:docMk/>
-            <pc:sldMk cId="469602028" sldId="292"/>
-            <ac:spMk id="2" creationId="{A0A94A42-AEA0-4D89-964D-C0B9EF281361}"/>
-          </ac:spMkLst>
-        </pc:spChg>
-        <pc:spChg chg="mod">
-          <ac:chgData name="Geoff Butcher" userId="1cb31d20-838c-4d88-81d0-dc1a78ccb326" providerId="ADAL" clId="{A42B9E86-A0DE-4982-A141-66AF500C2B3B}" dt="2021-02-08T12:02:15.302" v="6181" actId="20577"/>
-          <ac:spMkLst>
-            <pc:docMk/>
-            <pc:sldMk cId="469602028" sldId="292"/>
-            <ac:spMk id="3" creationId="{93C8C3B7-4D34-4B7E-A5C2-E2CFB4CFDBB0}"/>
-          </ac:spMkLst>
-        </pc:spChg>
-        <pc:picChg chg="add mod">
-          <ac:chgData name="Geoff Butcher" userId="1cb31d20-838c-4d88-81d0-dc1a78ccb326" providerId="ADAL" clId="{A42B9E86-A0DE-4982-A141-66AF500C2B3B}" dt="2021-02-08T12:00:46.317" v="5837" actId="1076"/>
-          <ac:picMkLst>
-            <pc:docMk/>
-            <pc:sldMk cId="469602028" sldId="292"/>
-            <ac:picMk id="5" creationId="{6D112ABE-526F-4137-9DBF-25CBF4A9D05E}"/>
-          </ac:picMkLst>
-        </pc:picChg>
-      </pc:sldChg>
-      <pc:sldChg chg="addSp delSp modSp add mod">
-        <pc:chgData name="Geoff Butcher" userId="1cb31d20-838c-4d88-81d0-dc1a78ccb326" providerId="ADAL" clId="{A42B9E86-A0DE-4982-A141-66AF500C2B3B}" dt="2021-02-08T12:07:02.634" v="6510" actId="20577"/>
-        <pc:sldMkLst>
-          <pc:docMk/>
-          <pc:sldMk cId="418820575" sldId="293"/>
-        </pc:sldMkLst>
-        <pc:spChg chg="mod">
-          <ac:chgData name="Geoff Butcher" userId="1cb31d20-838c-4d88-81d0-dc1a78ccb326" providerId="ADAL" clId="{A42B9E86-A0DE-4982-A141-66AF500C2B3B}" dt="2021-02-08T12:07:02.634" v="6510" actId="20577"/>
-          <ac:spMkLst>
-            <pc:docMk/>
-            <pc:sldMk cId="418820575" sldId="293"/>
-            <ac:spMk id="3" creationId="{93C8C3B7-4D34-4B7E-A5C2-E2CFB4CFDBB0}"/>
-          </ac:spMkLst>
-        </pc:spChg>
-        <pc:picChg chg="del">
-          <ac:chgData name="Geoff Butcher" userId="1cb31d20-838c-4d88-81d0-dc1a78ccb326" providerId="ADAL" clId="{A42B9E86-A0DE-4982-A141-66AF500C2B3B}" dt="2021-02-08T12:02:28.735" v="6183" actId="478"/>
-          <ac:picMkLst>
-            <pc:docMk/>
-            <pc:sldMk cId="418820575" sldId="293"/>
-            <ac:picMk id="5" creationId="{6D112ABE-526F-4137-9DBF-25CBF4A9D05E}"/>
-          </ac:picMkLst>
-        </pc:picChg>
-        <pc:picChg chg="add del mod">
-          <ac:chgData name="Geoff Butcher" userId="1cb31d20-838c-4d88-81d0-dc1a78ccb326" providerId="ADAL" clId="{A42B9E86-A0DE-4982-A141-66AF500C2B3B}" dt="2021-02-08T12:03:14.821" v="6190" actId="478"/>
-          <ac:picMkLst>
-            <pc:docMk/>
-            <pc:sldMk cId="418820575" sldId="293"/>
-            <ac:picMk id="6" creationId="{D8B7043F-92E5-45A0-842C-BE508381019A}"/>
-          </ac:picMkLst>
-        </pc:picChg>
-        <pc:picChg chg="add mod">
-          <ac:chgData name="Geoff Butcher" userId="1cb31d20-838c-4d88-81d0-dc1a78ccb326" providerId="ADAL" clId="{A42B9E86-A0DE-4982-A141-66AF500C2B3B}" dt="2021-02-08T12:05:37.402" v="6193" actId="27614"/>
-          <ac:picMkLst>
-            <pc:docMk/>
-            <pc:sldMk cId="418820575" sldId="293"/>
-            <ac:picMk id="8" creationId="{711F389A-4AD3-44F1-827F-3B48C61EFC5D}"/>
-          </ac:picMkLst>
-        </pc:picChg>
-      </pc:sldChg>
-      <pc:sldChg chg="addSp modSp new mod">
-        <pc:chgData name="Geoff Butcher" userId="1cb31d20-838c-4d88-81d0-dc1a78ccb326" providerId="ADAL" clId="{A42B9E86-A0DE-4982-A141-66AF500C2B3B}" dt="2021-02-08T12:15:06.152" v="7210" actId="20577"/>
-        <pc:sldMkLst>
-          <pc:docMk/>
-          <pc:sldMk cId="170133376" sldId="294"/>
-        </pc:sldMkLst>
-        <pc:spChg chg="mod">
-          <ac:chgData name="Geoff Butcher" userId="1cb31d20-838c-4d88-81d0-dc1a78ccb326" providerId="ADAL" clId="{A42B9E86-A0DE-4982-A141-66AF500C2B3B}" dt="2021-02-08T12:07:17.709" v="6533" actId="20577"/>
-          <ac:spMkLst>
-            <pc:docMk/>
-            <pc:sldMk cId="170133376" sldId="294"/>
-            <ac:spMk id="2" creationId="{7FBE8BF9-2297-401B-96A8-D7B9EE3FDA05}"/>
-          </ac:spMkLst>
-        </pc:spChg>
-        <pc:spChg chg="mod">
-          <ac:chgData name="Geoff Butcher" userId="1cb31d20-838c-4d88-81d0-dc1a78ccb326" providerId="ADAL" clId="{A42B9E86-A0DE-4982-A141-66AF500C2B3B}" dt="2021-02-08T12:15:06.152" v="7210" actId="20577"/>
-          <ac:spMkLst>
-            <pc:docMk/>
-            <pc:sldMk cId="170133376" sldId="294"/>
-            <ac:spMk id="3" creationId="{6A924FDE-9600-43F7-8E67-8843B2847DA5}"/>
-          </ac:spMkLst>
-        </pc:spChg>
-        <pc:picChg chg="add mod">
-          <ac:chgData name="Geoff Butcher" userId="1cb31d20-838c-4d88-81d0-dc1a78ccb326" providerId="ADAL" clId="{A42B9E86-A0DE-4982-A141-66AF500C2B3B}" dt="2021-02-08T12:13:07.465" v="6799" actId="27614"/>
-          <ac:picMkLst>
-            <pc:docMk/>
-            <pc:sldMk cId="170133376" sldId="294"/>
-            <ac:picMk id="5" creationId="{109DFEB7-0FFC-43FA-B43A-7ACAC1D80E63}"/>
-          </ac:picMkLst>
-        </pc:picChg>
-      </pc:sldChg>
-      <pc:sldChg chg="modSp new mod">
-        <pc:chgData name="Geoff Butcher" userId="1cb31d20-838c-4d88-81d0-dc1a78ccb326" providerId="ADAL" clId="{A42B9E86-A0DE-4982-A141-66AF500C2B3B}" dt="2021-02-08T12:17:00.906" v="7622" actId="20577"/>
-        <pc:sldMkLst>
-          <pc:docMk/>
-          <pc:sldMk cId="2162200981" sldId="295"/>
-        </pc:sldMkLst>
-        <pc:spChg chg="mod">
-          <ac:chgData name="Geoff Butcher" userId="1cb31d20-838c-4d88-81d0-dc1a78ccb326" providerId="ADAL" clId="{A42B9E86-A0DE-4982-A141-66AF500C2B3B}" dt="2021-02-08T12:15:29.339" v="7303" actId="20577"/>
-          <ac:spMkLst>
-            <pc:docMk/>
-            <pc:sldMk cId="2162200981" sldId="295"/>
-            <ac:spMk id="2" creationId="{D4C7AB93-C5AC-4CC3-BA8C-7B5323665E5E}"/>
-          </ac:spMkLst>
-        </pc:spChg>
-        <pc:spChg chg="mod">
-          <ac:chgData name="Geoff Butcher" userId="1cb31d20-838c-4d88-81d0-dc1a78ccb326" providerId="ADAL" clId="{A42B9E86-A0DE-4982-A141-66AF500C2B3B}" dt="2021-02-08T12:17:00.906" v="7622" actId="20577"/>
-          <ac:spMkLst>
-            <pc:docMk/>
-            <pc:sldMk cId="2162200981" sldId="295"/>
-            <ac:spMk id="3" creationId="{428BBB71-2B59-49E0-B4AC-4AB134217278}"/>
-          </ac:spMkLst>
-        </pc:spChg>
-      </pc:sldChg>
-      <pc:sldMasterChg chg="modSldLayout">
-        <pc:chgData name="Geoff Butcher" userId="1cb31d20-838c-4d88-81d0-dc1a78ccb326" providerId="ADAL" clId="{A42B9E86-A0DE-4982-A141-66AF500C2B3B}" dt="2021-02-07T18:18:47.822" v="263" actId="115"/>
-        <pc:sldMasterMkLst>
-          <pc:docMk/>
-          <pc:sldMasterMk cId="1309764198" sldId="2147483648"/>
-        </pc:sldMasterMkLst>
-        <pc:sldLayoutChg chg="delSp modSp mod">
-          <pc:chgData name="Geoff Butcher" userId="1cb31d20-838c-4d88-81d0-dc1a78ccb326" providerId="ADAL" clId="{A42B9E86-A0DE-4982-A141-66AF500C2B3B}" dt="2021-02-07T18:18:47.822" v="263" actId="115"/>
-          <pc:sldLayoutMkLst>
-            <pc:docMk/>
-            <pc:sldMasterMk cId="1309764198" sldId="2147483648"/>
-            <pc:sldLayoutMk cId="458035802" sldId="2147483650"/>
-          </pc:sldLayoutMkLst>
-          <pc:spChg chg="mod">
-            <ac:chgData name="Geoff Butcher" userId="1cb31d20-838c-4d88-81d0-dc1a78ccb326" providerId="ADAL" clId="{A42B9E86-A0DE-4982-A141-66AF500C2B3B}" dt="2021-02-07T18:18:47.822" v="263" actId="115"/>
-            <ac:spMkLst>
-              <pc:docMk/>
-              <pc:sldMasterMk cId="1309764198" sldId="2147483648"/>
-              <pc:sldLayoutMk cId="458035802" sldId="2147483650"/>
-              <ac:spMk id="12" creationId="{F4478CD4-CD97-4F35-8C52-137DF21BED6A}"/>
-            </ac:spMkLst>
-          </pc:spChg>
-          <pc:graphicFrameChg chg="del mod">
-            <ac:chgData name="Geoff Butcher" userId="1cb31d20-838c-4d88-81d0-dc1a78ccb326" providerId="ADAL" clId="{A42B9E86-A0DE-4982-A141-66AF500C2B3B}" dt="2021-02-07T18:17:13.340" v="37" actId="478"/>
-            <ac:graphicFrameMkLst>
-              <pc:docMk/>
-              <pc:sldMasterMk cId="1309764198" sldId="2147483648"/>
-              <pc:sldLayoutMk cId="458035802" sldId="2147483650"/>
-              <ac:graphicFrameMk id="6" creationId="{2F68D10A-6776-4E33-B03D-39B5D5059C80}"/>
-            </ac:graphicFrameMkLst>
-          </pc:graphicFrameChg>
-        </pc:sldLayoutChg>
-      </pc:sldMasterChg>
-    </pc:docChg>
-  </pc:docChgLst>
-  <pc:docChgLst>
     <pc:chgData name="Geoff Butcher" userId="1cb31d20-838c-4d88-81d0-dc1a78ccb326" providerId="ADAL" clId="{180F5F75-A101-4134-9315-E8E9101F6FDF}"/>
     <pc:docChg chg="undo redo custSel addSld delSld modSld sldOrd">
       <pc:chgData name="Geoff Butcher" userId="1cb31d20-838c-4d88-81d0-dc1a78ccb326" providerId="ADAL" clId="{180F5F75-A101-4134-9315-E8E9101F6FDF}" dt="2021-02-11T16:07:03.500" v="8624" actId="1076"/>
@@ -2535,6 +1705,836 @@
       </pc:sldChg>
     </pc:docChg>
   </pc:docChgLst>
+  <pc:docChgLst>
+    <pc:chgData name="Geoff Butcher" userId="1cb31d20-838c-4d88-81d0-dc1a78ccb326" providerId="ADAL" clId="{A42B9E86-A0DE-4982-A141-66AF500C2B3B}"/>
+    <pc:docChg chg="undo custSel addSld delSld modSld sldOrd modMainMaster">
+      <pc:chgData name="Geoff Butcher" userId="1cb31d20-838c-4d88-81d0-dc1a78ccb326" providerId="ADAL" clId="{A42B9E86-A0DE-4982-A141-66AF500C2B3B}" dt="2021-02-08T12:18:24.525" v="7624" actId="1076"/>
+      <pc:docMkLst>
+        <pc:docMk/>
+      </pc:docMkLst>
+      <pc:sldChg chg="modSp mod">
+        <pc:chgData name="Geoff Butcher" userId="1cb31d20-838c-4d88-81d0-dc1a78ccb326" providerId="ADAL" clId="{A42B9E86-A0DE-4982-A141-66AF500C2B3B}" dt="2021-02-07T18:33:26.476" v="854" actId="20577"/>
+        <pc:sldMkLst>
+          <pc:docMk/>
+          <pc:sldMk cId="1623591203" sldId="256"/>
+        </pc:sldMkLst>
+        <pc:spChg chg="mod">
+          <ac:chgData name="Geoff Butcher" userId="1cb31d20-838c-4d88-81d0-dc1a78ccb326" providerId="ADAL" clId="{A42B9E86-A0DE-4982-A141-66AF500C2B3B}" dt="2021-02-07T18:33:26.476" v="854" actId="20577"/>
+          <ac:spMkLst>
+            <pc:docMk/>
+            <pc:sldMk cId="1623591203" sldId="256"/>
+            <ac:spMk id="3" creationId="{6C3DF028-08B5-467A-BCAB-6E353E480A02}"/>
+          </ac:spMkLst>
+        </pc:spChg>
+      </pc:sldChg>
+      <pc:sldChg chg="del">
+        <pc:chgData name="Geoff Butcher" userId="1cb31d20-838c-4d88-81d0-dc1a78ccb326" providerId="ADAL" clId="{A42B9E86-A0DE-4982-A141-66AF500C2B3B}" dt="2021-02-07T18:16:40.090" v="0" actId="47"/>
+        <pc:sldMkLst>
+          <pc:docMk/>
+          <pc:sldMk cId="2282438210" sldId="276"/>
+        </pc:sldMkLst>
+      </pc:sldChg>
+      <pc:sldChg chg="addSp delSp modSp new mod">
+        <pc:chgData name="Geoff Butcher" userId="1cb31d20-838c-4d88-81d0-dc1a78ccb326" providerId="ADAL" clId="{A42B9E86-A0DE-4982-A141-66AF500C2B3B}" dt="2021-02-07T18:22:24.777" v="760" actId="27636"/>
+        <pc:sldMkLst>
+          <pc:docMk/>
+          <pc:sldMk cId="1502008898" sldId="278"/>
+        </pc:sldMkLst>
+        <pc:spChg chg="mod">
+          <ac:chgData name="Geoff Butcher" userId="1cb31d20-838c-4d88-81d0-dc1a78ccb326" providerId="ADAL" clId="{A42B9E86-A0DE-4982-A141-66AF500C2B3B}" dt="2021-02-07T18:16:53.605" v="35" actId="20577"/>
+          <ac:spMkLst>
+            <pc:docMk/>
+            <pc:sldMk cId="1502008898" sldId="278"/>
+            <ac:spMk id="2" creationId="{A0B28261-B967-4C68-8783-7DCBD049E8FD}"/>
+          </ac:spMkLst>
+        </pc:spChg>
+        <pc:spChg chg="add del mod">
+          <ac:chgData name="Geoff Butcher" userId="1cb31d20-838c-4d88-81d0-dc1a78ccb326" providerId="ADAL" clId="{A42B9E86-A0DE-4982-A141-66AF500C2B3B}" dt="2021-02-07T18:22:24.777" v="760" actId="27636"/>
+          <ac:spMkLst>
+            <pc:docMk/>
+            <pc:sldMk cId="1502008898" sldId="278"/>
+            <ac:spMk id="3" creationId="{C21548A7-856A-423C-B856-D820BC415E43}"/>
+          </ac:spMkLst>
+        </pc:spChg>
+        <pc:spChg chg="add del mod">
+          <ac:chgData name="Geoff Butcher" userId="1cb31d20-838c-4d88-81d0-dc1a78ccb326" providerId="ADAL" clId="{A42B9E86-A0DE-4982-A141-66AF500C2B3B}" dt="2021-02-07T18:19:38.406" v="299" actId="11529"/>
+          <ac:spMkLst>
+            <pc:docMk/>
+            <pc:sldMk cId="1502008898" sldId="278"/>
+            <ac:spMk id="4" creationId="{6B1081A9-04CA-4F67-988E-DF0BB5107602}"/>
+          </ac:spMkLst>
+        </pc:spChg>
+        <pc:spChg chg="add mod">
+          <ac:chgData name="Geoff Butcher" userId="1cb31d20-838c-4d88-81d0-dc1a78ccb326" providerId="ADAL" clId="{A42B9E86-A0DE-4982-A141-66AF500C2B3B}" dt="2021-02-07T18:19:36.815" v="294" actId="571"/>
+          <ac:spMkLst>
+            <pc:docMk/>
+            <pc:sldMk cId="1502008898" sldId="278"/>
+            <ac:spMk id="5" creationId="{937217AB-9F7C-4CC6-A39C-B1A9CFA38FB6}"/>
+          </ac:spMkLst>
+        </pc:spChg>
+        <pc:spChg chg="add mod">
+          <ac:chgData name="Geoff Butcher" userId="1cb31d20-838c-4d88-81d0-dc1a78ccb326" providerId="ADAL" clId="{A42B9E86-A0DE-4982-A141-66AF500C2B3B}" dt="2021-02-07T18:21:12.582" v="585" actId="115"/>
+          <ac:spMkLst>
+            <pc:docMk/>
+            <pc:sldMk cId="1502008898" sldId="278"/>
+            <ac:spMk id="6" creationId="{905F5F27-5928-4697-8A64-521401D86C88}"/>
+          </ac:spMkLst>
+        </pc:spChg>
+        <pc:spChg chg="add mod">
+          <ac:chgData name="Geoff Butcher" userId="1cb31d20-838c-4d88-81d0-dc1a78ccb326" providerId="ADAL" clId="{A42B9E86-A0DE-4982-A141-66AF500C2B3B}" dt="2021-02-07T18:21:39.866" v="651" actId="20577"/>
+          <ac:spMkLst>
+            <pc:docMk/>
+            <pc:sldMk cId="1502008898" sldId="278"/>
+            <ac:spMk id="7" creationId="{D7E50970-73DE-49D3-A73D-532500ADEAEC}"/>
+          </ac:spMkLst>
+        </pc:spChg>
+      </pc:sldChg>
+      <pc:sldChg chg="modSp add mod">
+        <pc:chgData name="Geoff Butcher" userId="1cb31d20-838c-4d88-81d0-dc1a78ccb326" providerId="ADAL" clId="{A42B9E86-A0DE-4982-A141-66AF500C2B3B}" dt="2021-02-07T18:23:12.328" v="810" actId="1076"/>
+        <pc:sldMkLst>
+          <pc:docMk/>
+          <pc:sldMk cId="2748250560" sldId="279"/>
+        </pc:sldMkLst>
+        <pc:spChg chg="mod">
+          <ac:chgData name="Geoff Butcher" userId="1cb31d20-838c-4d88-81d0-dc1a78ccb326" providerId="ADAL" clId="{A42B9E86-A0DE-4982-A141-66AF500C2B3B}" dt="2021-02-07T18:23:12.328" v="810" actId="1076"/>
+          <ac:spMkLst>
+            <pc:docMk/>
+            <pc:sldMk cId="2748250560" sldId="279"/>
+            <ac:spMk id="6" creationId="{905F5F27-5928-4697-8A64-521401D86C88}"/>
+          </ac:spMkLst>
+        </pc:spChg>
+        <pc:spChg chg="mod">
+          <ac:chgData name="Geoff Butcher" userId="1cb31d20-838c-4d88-81d0-dc1a78ccb326" providerId="ADAL" clId="{A42B9E86-A0DE-4982-A141-66AF500C2B3B}" dt="2021-02-07T18:23:11.208" v="809" actId="1076"/>
+          <ac:spMkLst>
+            <pc:docMk/>
+            <pc:sldMk cId="2748250560" sldId="279"/>
+            <ac:spMk id="7" creationId="{D7E50970-73DE-49D3-A73D-532500ADEAEC}"/>
+          </ac:spMkLst>
+        </pc:spChg>
+      </pc:sldChg>
+      <pc:sldChg chg="addSp delSp modSp new mod">
+        <pc:chgData name="Geoff Butcher" userId="1cb31d20-838c-4d88-81d0-dc1a78ccb326" providerId="ADAL" clId="{A42B9E86-A0DE-4982-A141-66AF500C2B3B}" dt="2021-02-07T18:42:17.722" v="1692"/>
+        <pc:sldMkLst>
+          <pc:docMk/>
+          <pc:sldMk cId="1254132252" sldId="280"/>
+        </pc:sldMkLst>
+        <pc:spChg chg="mod">
+          <ac:chgData name="Geoff Butcher" userId="1cb31d20-838c-4d88-81d0-dc1a78ccb326" providerId="ADAL" clId="{A42B9E86-A0DE-4982-A141-66AF500C2B3B}" dt="2021-02-07T18:33:41.168" v="856"/>
+          <ac:spMkLst>
+            <pc:docMk/>
+            <pc:sldMk cId="1254132252" sldId="280"/>
+            <ac:spMk id="2" creationId="{6EDF3730-F26B-4759-A1BB-6821D85BA9A8}"/>
+          </ac:spMkLst>
+        </pc:spChg>
+        <pc:spChg chg="mod">
+          <ac:chgData name="Geoff Butcher" userId="1cb31d20-838c-4d88-81d0-dc1a78ccb326" providerId="ADAL" clId="{A42B9E86-A0DE-4982-A141-66AF500C2B3B}" dt="2021-02-07T18:40:04.664" v="1627" actId="27636"/>
+          <ac:spMkLst>
+            <pc:docMk/>
+            <pc:sldMk cId="1254132252" sldId="280"/>
+            <ac:spMk id="3" creationId="{FA8CECFA-1E6F-4264-A092-BAEA1D19BCFA}"/>
+          </ac:spMkLst>
+        </pc:spChg>
+        <pc:spChg chg="add del mod">
+          <ac:chgData name="Geoff Butcher" userId="1cb31d20-838c-4d88-81d0-dc1a78ccb326" providerId="ADAL" clId="{A42B9E86-A0DE-4982-A141-66AF500C2B3B}" dt="2021-02-07T18:42:17.722" v="1692"/>
+          <ac:spMkLst>
+            <pc:docMk/>
+            <pc:sldMk cId="1254132252" sldId="280"/>
+            <ac:spMk id="6" creationId="{59C38871-B1E4-4023-91FE-407B3275FCE3}"/>
+          </ac:spMkLst>
+        </pc:spChg>
+        <pc:picChg chg="add mod">
+          <ac:chgData name="Geoff Butcher" userId="1cb31d20-838c-4d88-81d0-dc1a78ccb326" providerId="ADAL" clId="{A42B9E86-A0DE-4982-A141-66AF500C2B3B}" dt="2021-02-07T18:35:15.175" v="867" actId="1076"/>
+          <ac:picMkLst>
+            <pc:docMk/>
+            <pc:sldMk cId="1254132252" sldId="280"/>
+            <ac:picMk id="5" creationId="{6C7FCA2E-8E18-4052-9F9E-737F534F33EA}"/>
+          </ac:picMkLst>
+        </pc:picChg>
+      </pc:sldChg>
+      <pc:sldChg chg="addSp delSp modSp new mod">
+        <pc:chgData name="Geoff Butcher" userId="1cb31d20-838c-4d88-81d0-dc1a78ccb326" providerId="ADAL" clId="{A42B9E86-A0DE-4982-A141-66AF500C2B3B}" dt="2021-02-07T19:36:45.688" v="2176" actId="1076"/>
+        <pc:sldMkLst>
+          <pc:docMk/>
+          <pc:sldMk cId="104411360" sldId="281"/>
+        </pc:sldMkLst>
+        <pc:spChg chg="mod">
+          <ac:chgData name="Geoff Butcher" userId="1cb31d20-838c-4d88-81d0-dc1a78ccb326" providerId="ADAL" clId="{A42B9E86-A0DE-4982-A141-66AF500C2B3B}" dt="2021-02-07T18:40:35.288" v="1683" actId="20577"/>
+          <ac:spMkLst>
+            <pc:docMk/>
+            <pc:sldMk cId="104411360" sldId="281"/>
+            <ac:spMk id="2" creationId="{0F6ECDB8-7AFF-4730-B306-16237845B1A1}"/>
+          </ac:spMkLst>
+        </pc:spChg>
+        <pc:spChg chg="del mod">
+          <ac:chgData name="Geoff Butcher" userId="1cb31d20-838c-4d88-81d0-dc1a78ccb326" providerId="ADAL" clId="{A42B9E86-A0DE-4982-A141-66AF500C2B3B}" dt="2021-02-07T18:42:00.641" v="1685" actId="931"/>
+          <ac:spMkLst>
+            <pc:docMk/>
+            <pc:sldMk cId="104411360" sldId="281"/>
+            <ac:spMk id="3" creationId="{B9C9CD9D-3A09-445D-AC2E-089A31A06445}"/>
+          </ac:spMkLst>
+        </pc:spChg>
+        <pc:spChg chg="add mod">
+          <ac:chgData name="Geoff Butcher" userId="1cb31d20-838c-4d88-81d0-dc1a78ccb326" providerId="ADAL" clId="{A42B9E86-A0DE-4982-A141-66AF500C2B3B}" dt="2021-02-07T18:44:25.051" v="2113" actId="20577"/>
+          <ac:spMkLst>
+            <pc:docMk/>
+            <pc:sldMk cId="104411360" sldId="281"/>
+            <ac:spMk id="6" creationId="{B959F6FB-8BD4-4026-8E2F-CE496E462396}"/>
+          </ac:spMkLst>
+        </pc:spChg>
+        <pc:graphicFrameChg chg="add mod modGraphic">
+          <ac:chgData name="Geoff Butcher" userId="1cb31d20-838c-4d88-81d0-dc1a78ccb326" providerId="ADAL" clId="{A42B9E86-A0DE-4982-A141-66AF500C2B3B}" dt="2021-02-07T18:45:32.115" v="2174" actId="1076"/>
+          <ac:graphicFrameMkLst>
+            <pc:docMk/>
+            <pc:sldMk cId="104411360" sldId="281"/>
+            <ac:graphicFrameMk id="7" creationId="{5D3856FC-198E-450B-96C1-43069028B324}"/>
+          </ac:graphicFrameMkLst>
+        </pc:graphicFrameChg>
+        <pc:picChg chg="add mod">
+          <ac:chgData name="Geoff Butcher" userId="1cb31d20-838c-4d88-81d0-dc1a78ccb326" providerId="ADAL" clId="{A42B9E86-A0DE-4982-A141-66AF500C2B3B}" dt="2021-02-07T19:36:45.688" v="2176" actId="1076"/>
+          <ac:picMkLst>
+            <pc:docMk/>
+            <pc:sldMk cId="104411360" sldId="281"/>
+            <ac:picMk id="5" creationId="{F0B28B21-C82F-4449-86B0-75867275416A}"/>
+          </ac:picMkLst>
+        </pc:picChg>
+      </pc:sldChg>
+      <pc:sldChg chg="addSp modSp new mod">
+        <pc:chgData name="Geoff Butcher" userId="1cb31d20-838c-4d88-81d0-dc1a78ccb326" providerId="ADAL" clId="{A42B9E86-A0DE-4982-A141-66AF500C2B3B}" dt="2021-02-07T19:42:43.116" v="2899" actId="1582"/>
+        <pc:sldMkLst>
+          <pc:docMk/>
+          <pc:sldMk cId="26861849" sldId="282"/>
+        </pc:sldMkLst>
+        <pc:spChg chg="mod">
+          <ac:chgData name="Geoff Butcher" userId="1cb31d20-838c-4d88-81d0-dc1a78ccb326" providerId="ADAL" clId="{A42B9E86-A0DE-4982-A141-66AF500C2B3B}" dt="2021-02-07T19:39:17.622" v="2457" actId="20577"/>
+          <ac:spMkLst>
+            <pc:docMk/>
+            <pc:sldMk cId="26861849" sldId="282"/>
+            <ac:spMk id="2" creationId="{D096A4EE-A0BC-4F03-8E25-18D6A161084C}"/>
+          </ac:spMkLst>
+        </pc:spChg>
+        <pc:spChg chg="mod">
+          <ac:chgData name="Geoff Butcher" userId="1cb31d20-838c-4d88-81d0-dc1a78ccb326" providerId="ADAL" clId="{A42B9E86-A0DE-4982-A141-66AF500C2B3B}" dt="2021-02-07T19:41:44.471" v="2885" actId="20577"/>
+          <ac:spMkLst>
+            <pc:docMk/>
+            <pc:sldMk cId="26861849" sldId="282"/>
+            <ac:spMk id="3" creationId="{B4C3BC92-CF5A-49E9-86E4-1D6C7E99809A}"/>
+          </ac:spMkLst>
+        </pc:spChg>
+        <pc:spChg chg="add mod">
+          <ac:chgData name="Geoff Butcher" userId="1cb31d20-838c-4d88-81d0-dc1a78ccb326" providerId="ADAL" clId="{A42B9E86-A0DE-4982-A141-66AF500C2B3B}" dt="2021-02-07T19:42:43.116" v="2899" actId="1582"/>
+          <ac:spMkLst>
+            <pc:docMk/>
+            <pc:sldMk cId="26861849" sldId="282"/>
+            <ac:spMk id="7" creationId="{68B2CD1C-3720-4729-B310-51AD33989F6A}"/>
+          </ac:spMkLst>
+        </pc:spChg>
+        <pc:picChg chg="add mod">
+          <ac:chgData name="Geoff Butcher" userId="1cb31d20-838c-4d88-81d0-dc1a78ccb326" providerId="ADAL" clId="{A42B9E86-A0DE-4982-A141-66AF500C2B3B}" dt="2021-02-07T19:42:04.364" v="2886" actId="1076"/>
+          <ac:picMkLst>
+            <pc:docMk/>
+            <pc:sldMk cId="26861849" sldId="282"/>
+            <ac:picMk id="5" creationId="{6B8F32DC-3F08-43AE-9DC8-C4859617BBBB}"/>
+          </ac:picMkLst>
+        </pc:picChg>
+        <pc:picChg chg="add mod modCrop">
+          <ac:chgData name="Geoff Butcher" userId="1cb31d20-838c-4d88-81d0-dc1a78ccb326" providerId="ADAL" clId="{A42B9E86-A0DE-4982-A141-66AF500C2B3B}" dt="2021-02-07T19:42:28.548" v="2895" actId="1076"/>
+          <ac:picMkLst>
+            <pc:docMk/>
+            <pc:sldMk cId="26861849" sldId="282"/>
+            <ac:picMk id="6" creationId="{ACA5563D-75F4-43AF-92A6-51DDF0F67594}"/>
+          </ac:picMkLst>
+        </pc:picChg>
+      </pc:sldChg>
+      <pc:sldChg chg="addSp modSp new mod">
+        <pc:chgData name="Geoff Butcher" userId="1cb31d20-838c-4d88-81d0-dc1a78ccb326" providerId="ADAL" clId="{A42B9E86-A0DE-4982-A141-66AF500C2B3B}" dt="2021-02-08T12:18:24.525" v="7624" actId="1076"/>
+        <pc:sldMkLst>
+          <pc:docMk/>
+          <pc:sldMk cId="1836482924" sldId="283"/>
+        </pc:sldMkLst>
+        <pc:spChg chg="mod">
+          <ac:chgData name="Geoff Butcher" userId="1cb31d20-838c-4d88-81d0-dc1a78ccb326" providerId="ADAL" clId="{A42B9E86-A0DE-4982-A141-66AF500C2B3B}" dt="2021-02-07T19:37:23.281" v="2183" actId="20577"/>
+          <ac:spMkLst>
+            <pc:docMk/>
+            <pc:sldMk cId="1836482924" sldId="283"/>
+            <ac:spMk id="2" creationId="{417B3C36-7DFC-4F17-9B2D-797B93A85716}"/>
+          </ac:spMkLst>
+        </pc:spChg>
+        <pc:spChg chg="mod">
+          <ac:chgData name="Geoff Butcher" userId="1cb31d20-838c-4d88-81d0-dc1a78ccb326" providerId="ADAL" clId="{A42B9E86-A0DE-4982-A141-66AF500C2B3B}" dt="2021-02-07T19:38:56.327" v="2418" actId="20577"/>
+          <ac:spMkLst>
+            <pc:docMk/>
+            <pc:sldMk cId="1836482924" sldId="283"/>
+            <ac:spMk id="3" creationId="{7FD71824-7BE7-4168-8C8D-1FC19362F6D6}"/>
+          </ac:spMkLst>
+        </pc:spChg>
+        <pc:picChg chg="add mod">
+          <ac:chgData name="Geoff Butcher" userId="1cb31d20-838c-4d88-81d0-dc1a78ccb326" providerId="ADAL" clId="{A42B9E86-A0DE-4982-A141-66AF500C2B3B}" dt="2021-02-08T12:18:24.525" v="7624" actId="1076"/>
+          <ac:picMkLst>
+            <pc:docMk/>
+            <pc:sldMk cId="1836482924" sldId="283"/>
+            <ac:picMk id="4" creationId="{EA23B843-211F-4A7F-AFC2-21B22B0D76FA}"/>
+          </ac:picMkLst>
+        </pc:picChg>
+      </pc:sldChg>
+      <pc:sldChg chg="addSp modSp new mod">
+        <pc:chgData name="Geoff Butcher" userId="1cb31d20-838c-4d88-81d0-dc1a78ccb326" providerId="ADAL" clId="{A42B9E86-A0DE-4982-A141-66AF500C2B3B}" dt="2021-02-07T19:45:14.874" v="3172" actId="14100"/>
+        <pc:sldMkLst>
+          <pc:docMk/>
+          <pc:sldMk cId="295329404" sldId="284"/>
+        </pc:sldMkLst>
+        <pc:spChg chg="mod">
+          <ac:chgData name="Geoff Butcher" userId="1cb31d20-838c-4d88-81d0-dc1a78ccb326" providerId="ADAL" clId="{A42B9E86-A0DE-4982-A141-66AF500C2B3B}" dt="2021-02-07T19:42:55.771" v="2911" actId="20577"/>
+          <ac:spMkLst>
+            <pc:docMk/>
+            <pc:sldMk cId="295329404" sldId="284"/>
+            <ac:spMk id="2" creationId="{115AA3D3-72DB-4D83-8178-E999A2867E71}"/>
+          </ac:spMkLst>
+        </pc:spChg>
+        <pc:spChg chg="mod">
+          <ac:chgData name="Geoff Butcher" userId="1cb31d20-838c-4d88-81d0-dc1a78ccb326" providerId="ADAL" clId="{A42B9E86-A0DE-4982-A141-66AF500C2B3B}" dt="2021-02-07T19:45:14.874" v="3172" actId="14100"/>
+          <ac:spMkLst>
+            <pc:docMk/>
+            <pc:sldMk cId="295329404" sldId="284"/>
+            <ac:spMk id="3" creationId="{C2B84226-957B-4002-BCAC-7B9B311EAD2C}"/>
+          </ac:spMkLst>
+        </pc:spChg>
+        <pc:picChg chg="add mod">
+          <ac:chgData name="Geoff Butcher" userId="1cb31d20-838c-4d88-81d0-dc1a78ccb326" providerId="ADAL" clId="{A42B9E86-A0DE-4982-A141-66AF500C2B3B}" dt="2021-02-07T19:43:45.536" v="2918" actId="27614"/>
+          <ac:picMkLst>
+            <pc:docMk/>
+            <pc:sldMk cId="295329404" sldId="284"/>
+            <ac:picMk id="5" creationId="{881F3A44-3D96-4BF8-B229-8D0DE04D9060}"/>
+          </ac:picMkLst>
+        </pc:picChg>
+      </pc:sldChg>
+      <pc:sldChg chg="addSp modSp add mod">
+        <pc:chgData name="Geoff Butcher" userId="1cb31d20-838c-4d88-81d0-dc1a78ccb326" providerId="ADAL" clId="{A42B9E86-A0DE-4982-A141-66AF500C2B3B}" dt="2021-02-07T19:49:36.859" v="3647" actId="14100"/>
+        <pc:sldMkLst>
+          <pc:docMk/>
+          <pc:sldMk cId="3301953182" sldId="285"/>
+        </pc:sldMkLst>
+        <pc:spChg chg="mod">
+          <ac:chgData name="Geoff Butcher" userId="1cb31d20-838c-4d88-81d0-dc1a78ccb326" providerId="ADAL" clId="{A42B9E86-A0DE-4982-A141-66AF500C2B3B}" dt="2021-02-07T19:47:06.855" v="3500" actId="20577"/>
+          <ac:spMkLst>
+            <pc:docMk/>
+            <pc:sldMk cId="3301953182" sldId="285"/>
+            <ac:spMk id="3" creationId="{C2B84226-957B-4002-BCAC-7B9B311EAD2C}"/>
+          </ac:spMkLst>
+        </pc:spChg>
+        <pc:spChg chg="add mod">
+          <ac:chgData name="Geoff Butcher" userId="1cb31d20-838c-4d88-81d0-dc1a78ccb326" providerId="ADAL" clId="{A42B9E86-A0DE-4982-A141-66AF500C2B3B}" dt="2021-02-07T19:49:10.727" v="3643" actId="208"/>
+          <ac:spMkLst>
+            <pc:docMk/>
+            <pc:sldMk cId="3301953182" sldId="285"/>
+            <ac:spMk id="4" creationId="{9BA327F6-F8E4-4AAC-9C66-41992EEFFFD5}"/>
+          </ac:spMkLst>
+        </pc:spChg>
+        <pc:spChg chg="add mod">
+          <ac:chgData name="Geoff Butcher" userId="1cb31d20-838c-4d88-81d0-dc1a78ccb326" providerId="ADAL" clId="{A42B9E86-A0DE-4982-A141-66AF500C2B3B}" dt="2021-02-07T19:48:59.977" v="3641" actId="208"/>
+          <ac:spMkLst>
+            <pc:docMk/>
+            <pc:sldMk cId="3301953182" sldId="285"/>
+            <ac:spMk id="9" creationId="{BD25DE61-E67B-42BC-A5CC-52521F07963C}"/>
+          </ac:spMkLst>
+        </pc:spChg>
+        <pc:picChg chg="mod modCrop">
+          <ac:chgData name="Geoff Butcher" userId="1cb31d20-838c-4d88-81d0-dc1a78ccb326" providerId="ADAL" clId="{A42B9E86-A0DE-4982-A141-66AF500C2B3B}" dt="2021-02-07T19:47:17.352" v="3501" actId="1076"/>
+          <ac:picMkLst>
+            <pc:docMk/>
+            <pc:sldMk cId="3301953182" sldId="285"/>
+            <ac:picMk id="5" creationId="{881F3A44-3D96-4BF8-B229-8D0DE04D9060}"/>
+          </ac:picMkLst>
+        </pc:picChg>
+        <pc:cxnChg chg="add mod">
+          <ac:chgData name="Geoff Butcher" userId="1cb31d20-838c-4d88-81d0-dc1a78ccb326" providerId="ADAL" clId="{A42B9E86-A0DE-4982-A141-66AF500C2B3B}" dt="2021-02-07T19:49:34.374" v="3646" actId="14100"/>
+          <ac:cxnSpMkLst>
+            <pc:docMk/>
+            <pc:sldMk cId="3301953182" sldId="285"/>
+            <ac:cxnSpMk id="7" creationId="{499AE502-BB78-4EDB-8608-E87CFEC79845}"/>
+          </ac:cxnSpMkLst>
+        </pc:cxnChg>
+        <pc:cxnChg chg="add mod">
+          <ac:chgData name="Geoff Butcher" userId="1cb31d20-838c-4d88-81d0-dc1a78ccb326" providerId="ADAL" clId="{A42B9E86-A0DE-4982-A141-66AF500C2B3B}" dt="2021-02-07T19:49:36.859" v="3647" actId="14100"/>
+          <ac:cxnSpMkLst>
+            <pc:docMk/>
+            <pc:sldMk cId="3301953182" sldId="285"/>
+            <ac:cxnSpMk id="11" creationId="{32861A94-D2E0-4DA4-A252-446A14679099}"/>
+          </ac:cxnSpMkLst>
+        </pc:cxnChg>
+      </pc:sldChg>
+      <pc:sldChg chg="addSp delSp modSp new mod">
+        <pc:chgData name="Geoff Butcher" userId="1cb31d20-838c-4d88-81d0-dc1a78ccb326" providerId="ADAL" clId="{A42B9E86-A0DE-4982-A141-66AF500C2B3B}" dt="2021-02-07T19:57:56.229" v="4344" actId="20577"/>
+        <pc:sldMkLst>
+          <pc:docMk/>
+          <pc:sldMk cId="3429103600" sldId="286"/>
+        </pc:sldMkLst>
+        <pc:spChg chg="mod">
+          <ac:chgData name="Geoff Butcher" userId="1cb31d20-838c-4d88-81d0-dc1a78ccb326" providerId="ADAL" clId="{A42B9E86-A0DE-4982-A141-66AF500C2B3B}" dt="2021-02-07T19:53:27.653" v="3842" actId="1076"/>
+          <ac:spMkLst>
+            <pc:docMk/>
+            <pc:sldMk cId="3429103600" sldId="286"/>
+            <ac:spMk id="2" creationId="{F00AA77D-B316-439C-B04D-965466209CF9}"/>
+          </ac:spMkLst>
+        </pc:spChg>
+        <pc:spChg chg="del">
+          <ac:chgData name="Geoff Butcher" userId="1cb31d20-838c-4d88-81d0-dc1a78ccb326" providerId="ADAL" clId="{A42B9E86-A0DE-4982-A141-66AF500C2B3B}" dt="2021-02-07T19:50:04.486" v="3662" actId="478"/>
+          <ac:spMkLst>
+            <pc:docMk/>
+            <pc:sldMk cId="3429103600" sldId="286"/>
+            <ac:spMk id="3" creationId="{CDC41527-56D9-4A6D-98CD-9D8ABE78FD26}"/>
+          </ac:spMkLst>
+        </pc:spChg>
+        <pc:spChg chg="add del mod">
+          <ac:chgData name="Geoff Butcher" userId="1cb31d20-838c-4d88-81d0-dc1a78ccb326" providerId="ADAL" clId="{A42B9E86-A0DE-4982-A141-66AF500C2B3B}" dt="2021-02-07T19:53:31.601" v="3843" actId="21"/>
+          <ac:spMkLst>
+            <pc:docMk/>
+            <pc:sldMk cId="3429103600" sldId="286"/>
+            <ac:spMk id="4" creationId="{6C151E39-505F-4EE6-BA7F-D69F573EEB4B}"/>
+          </ac:spMkLst>
+        </pc:spChg>
+        <pc:spChg chg="add del mod">
+          <ac:chgData name="Geoff Butcher" userId="1cb31d20-838c-4d88-81d0-dc1a78ccb326" providerId="ADAL" clId="{A42B9E86-A0DE-4982-A141-66AF500C2B3B}" dt="2021-02-07T19:50:42.660" v="3671"/>
+          <ac:spMkLst>
+            <pc:docMk/>
+            <pc:sldMk cId="3429103600" sldId="286"/>
+            <ac:spMk id="7" creationId="{01B53A98-6904-447F-A436-1B03DAAC9CAB}"/>
+          </ac:spMkLst>
+        </pc:spChg>
+        <pc:spChg chg="add del mod">
+          <ac:chgData name="Geoff Butcher" userId="1cb31d20-838c-4d88-81d0-dc1a78ccb326" providerId="ADAL" clId="{A42B9E86-A0DE-4982-A141-66AF500C2B3B}" dt="2021-02-07T19:53:31.601" v="3843" actId="21"/>
+          <ac:spMkLst>
+            <pc:docMk/>
+            <pc:sldMk cId="3429103600" sldId="286"/>
+            <ac:spMk id="11" creationId="{1DEE2647-44D1-4F97-A43B-E9A029B76C14}"/>
+          </ac:spMkLst>
+        </pc:spChg>
+        <pc:spChg chg="add del mod">
+          <ac:chgData name="Geoff Butcher" userId="1cb31d20-838c-4d88-81d0-dc1a78ccb326" providerId="ADAL" clId="{A42B9E86-A0DE-4982-A141-66AF500C2B3B}" dt="2021-02-07T19:53:31.601" v="3843" actId="21"/>
+          <ac:spMkLst>
+            <pc:docMk/>
+            <pc:sldMk cId="3429103600" sldId="286"/>
+            <ac:spMk id="12" creationId="{A3166B5A-6BDE-4353-AD34-37F197D5B2C5}"/>
+          </ac:spMkLst>
+        </pc:spChg>
+        <pc:spChg chg="add del mod">
+          <ac:chgData name="Geoff Butcher" userId="1cb31d20-838c-4d88-81d0-dc1a78ccb326" providerId="ADAL" clId="{A42B9E86-A0DE-4982-A141-66AF500C2B3B}" dt="2021-02-07T19:53:31.601" v="3843" actId="21"/>
+          <ac:spMkLst>
+            <pc:docMk/>
+            <pc:sldMk cId="3429103600" sldId="286"/>
+            <ac:spMk id="13" creationId="{11E62950-1495-4B4A-B2BB-5E68D72BEB8A}"/>
+          </ac:spMkLst>
+        </pc:spChg>
+        <pc:spChg chg="add del mod">
+          <ac:chgData name="Geoff Butcher" userId="1cb31d20-838c-4d88-81d0-dc1a78ccb326" providerId="ADAL" clId="{A42B9E86-A0DE-4982-A141-66AF500C2B3B}" dt="2021-02-07T19:53:31.601" v="3843" actId="21"/>
+          <ac:spMkLst>
+            <pc:docMk/>
+            <pc:sldMk cId="3429103600" sldId="286"/>
+            <ac:spMk id="14" creationId="{E96CFDFA-B08E-43FC-8DCD-7AFF2FD3E3EA}"/>
+          </ac:spMkLst>
+        </pc:spChg>
+        <pc:spChg chg="add del mod">
+          <ac:chgData name="Geoff Butcher" userId="1cb31d20-838c-4d88-81d0-dc1a78ccb326" providerId="ADAL" clId="{A42B9E86-A0DE-4982-A141-66AF500C2B3B}" dt="2021-02-07T19:53:31.601" v="3843" actId="21"/>
+          <ac:spMkLst>
+            <pc:docMk/>
+            <pc:sldMk cId="3429103600" sldId="286"/>
+            <ac:spMk id="15" creationId="{8170A232-F64F-42AA-B312-34902260F9DB}"/>
+          </ac:spMkLst>
+        </pc:spChg>
+        <pc:spChg chg="add mod">
+          <ac:chgData name="Geoff Butcher" userId="1cb31d20-838c-4d88-81d0-dc1a78ccb326" providerId="ADAL" clId="{A42B9E86-A0DE-4982-A141-66AF500C2B3B}" dt="2021-02-07T19:57:56.229" v="4344" actId="20577"/>
+          <ac:spMkLst>
+            <pc:docMk/>
+            <pc:sldMk cId="3429103600" sldId="286"/>
+            <ac:spMk id="17" creationId="{604C30FB-07B1-4DFB-ADD1-42E21E2E8199}"/>
+          </ac:spMkLst>
+        </pc:spChg>
+        <pc:picChg chg="add mod">
+          <ac:chgData name="Geoff Butcher" userId="1cb31d20-838c-4d88-81d0-dc1a78ccb326" providerId="ADAL" clId="{A42B9E86-A0DE-4982-A141-66AF500C2B3B}" dt="2021-02-07T19:53:43.695" v="3851" actId="1076"/>
+          <ac:picMkLst>
+            <pc:docMk/>
+            <pc:sldMk cId="3429103600" sldId="286"/>
+            <ac:picMk id="16" creationId="{1A23E5EB-2DE7-44FB-8478-EF4E29F73EBC}"/>
+          </ac:picMkLst>
+        </pc:picChg>
+        <pc:cxnChg chg="add del mod">
+          <ac:chgData name="Geoff Butcher" userId="1cb31d20-838c-4d88-81d0-dc1a78ccb326" providerId="ADAL" clId="{A42B9E86-A0DE-4982-A141-66AF500C2B3B}" dt="2021-02-07T19:53:31.601" v="3843" actId="21"/>
+          <ac:cxnSpMkLst>
+            <pc:docMk/>
+            <pc:sldMk cId="3429103600" sldId="286"/>
+            <ac:cxnSpMk id="6" creationId="{B386A81A-40AF-4675-80E2-02B12AB385B3}"/>
+          </ac:cxnSpMkLst>
+        </pc:cxnChg>
+        <pc:cxnChg chg="add del mod">
+          <ac:chgData name="Geoff Butcher" userId="1cb31d20-838c-4d88-81d0-dc1a78ccb326" providerId="ADAL" clId="{A42B9E86-A0DE-4982-A141-66AF500C2B3B}" dt="2021-02-07T19:53:31.601" v="3843" actId="21"/>
+          <ac:cxnSpMkLst>
+            <pc:docMk/>
+            <pc:sldMk cId="3429103600" sldId="286"/>
+            <ac:cxnSpMk id="8" creationId="{2491A057-6FA2-45B8-96C6-129EC500723A}"/>
+          </ac:cxnSpMkLst>
+        </pc:cxnChg>
+      </pc:sldChg>
+      <pc:sldChg chg="addSp delSp modSp new mod">
+        <pc:chgData name="Geoff Butcher" userId="1cb31d20-838c-4d88-81d0-dc1a78ccb326" providerId="ADAL" clId="{A42B9E86-A0DE-4982-A141-66AF500C2B3B}" dt="2021-02-07T19:56:00.524" v="3951" actId="207"/>
+        <pc:sldMkLst>
+          <pc:docMk/>
+          <pc:sldMk cId="503030251" sldId="287"/>
+        </pc:sldMkLst>
+        <pc:spChg chg="mod">
+          <ac:chgData name="Geoff Butcher" userId="1cb31d20-838c-4d88-81d0-dc1a78ccb326" providerId="ADAL" clId="{A42B9E86-A0DE-4982-A141-66AF500C2B3B}" dt="2021-02-07T19:52:59.090" v="3739" actId="20577"/>
+          <ac:spMkLst>
+            <pc:docMk/>
+            <pc:sldMk cId="503030251" sldId="287"/>
+            <ac:spMk id="2" creationId="{33E434F9-CD5D-4775-A445-ED79937F8CBD}"/>
+          </ac:spMkLst>
+        </pc:spChg>
+        <pc:spChg chg="mod">
+          <ac:chgData name="Geoff Butcher" userId="1cb31d20-838c-4d88-81d0-dc1a78ccb326" providerId="ADAL" clId="{A42B9E86-A0DE-4982-A141-66AF500C2B3B}" dt="2021-02-07T19:56:00.524" v="3951" actId="207"/>
+          <ac:spMkLst>
+            <pc:docMk/>
+            <pc:sldMk cId="503030251" sldId="287"/>
+            <ac:spMk id="3" creationId="{BF572ACE-7BA7-4E8A-9D43-DE04D42FDF36}"/>
+          </ac:spMkLst>
+        </pc:spChg>
+        <pc:spChg chg="add mod">
+          <ac:chgData name="Geoff Butcher" userId="1cb31d20-838c-4d88-81d0-dc1a78ccb326" providerId="ADAL" clId="{A42B9E86-A0DE-4982-A141-66AF500C2B3B}" dt="2021-02-07T19:53:52.921" v="3853" actId="1076"/>
+          <ac:spMkLst>
+            <pc:docMk/>
+            <pc:sldMk cId="503030251" sldId="287"/>
+            <ac:spMk id="4" creationId="{55539BBC-D941-482C-A666-6BFEFCB54620}"/>
+          </ac:spMkLst>
+        </pc:spChg>
+        <pc:spChg chg="add mod">
+          <ac:chgData name="Geoff Butcher" userId="1cb31d20-838c-4d88-81d0-dc1a78ccb326" providerId="ADAL" clId="{A42B9E86-A0DE-4982-A141-66AF500C2B3B}" dt="2021-02-07T19:54:56.750" v="3873" actId="1076"/>
+          <ac:spMkLst>
+            <pc:docMk/>
+            <pc:sldMk cId="503030251" sldId="287"/>
+            <ac:spMk id="8" creationId="{364183DB-FC4B-4FC3-9A20-259D91D7371D}"/>
+          </ac:spMkLst>
+        </pc:spChg>
+        <pc:spChg chg="add del mod">
+          <ac:chgData name="Geoff Butcher" userId="1cb31d20-838c-4d88-81d0-dc1a78ccb326" providerId="ADAL" clId="{A42B9E86-A0DE-4982-A141-66AF500C2B3B}" dt="2021-02-07T19:55:09.519" v="3876"/>
+          <ac:spMkLst>
+            <pc:docMk/>
+            <pc:sldMk cId="503030251" sldId="287"/>
+            <ac:spMk id="9" creationId="{BFE4EC91-685F-4566-ADA5-0E9EDF022AFB}"/>
+          </ac:spMkLst>
+        </pc:spChg>
+        <pc:spChg chg="add mod">
+          <ac:chgData name="Geoff Butcher" userId="1cb31d20-838c-4d88-81d0-dc1a78ccb326" providerId="ADAL" clId="{A42B9E86-A0DE-4982-A141-66AF500C2B3B}" dt="2021-02-07T19:55:20.683" v="3887" actId="20577"/>
+          <ac:spMkLst>
+            <pc:docMk/>
+            <pc:sldMk cId="503030251" sldId="287"/>
+            <ac:spMk id="10" creationId="{77BE3C8E-B078-43DB-BD52-F3C5AFB91E12}"/>
+          </ac:spMkLst>
+        </pc:spChg>
+        <pc:cxnChg chg="add mod">
+          <ac:chgData name="Geoff Butcher" userId="1cb31d20-838c-4d88-81d0-dc1a78ccb326" providerId="ADAL" clId="{A42B9E86-A0DE-4982-A141-66AF500C2B3B}" dt="2021-02-07T19:54:44.350" v="3867" actId="14100"/>
+          <ac:cxnSpMkLst>
+            <pc:docMk/>
+            <pc:sldMk cId="503030251" sldId="287"/>
+            <ac:cxnSpMk id="6" creationId="{3BB16819-9F98-4819-AB58-9099D3BD8FE3}"/>
+          </ac:cxnSpMkLst>
+        </pc:cxnChg>
+      </pc:sldChg>
+      <pc:sldChg chg="addSp delSp modSp new mod">
+        <pc:chgData name="Geoff Butcher" userId="1cb31d20-838c-4d88-81d0-dc1a78ccb326" providerId="ADAL" clId="{A42B9E86-A0DE-4982-A141-66AF500C2B3B}" dt="2021-02-08T11:58:43.777" v="5805" actId="20577"/>
+        <pc:sldMkLst>
+          <pc:docMk/>
+          <pc:sldMk cId="1452426237" sldId="288"/>
+        </pc:sldMkLst>
+        <pc:spChg chg="mod">
+          <ac:chgData name="Geoff Butcher" userId="1cb31d20-838c-4d88-81d0-dc1a78ccb326" providerId="ADAL" clId="{A42B9E86-A0DE-4982-A141-66AF500C2B3B}" dt="2021-02-08T08:36:23.652" v="4353" actId="20577"/>
+          <ac:spMkLst>
+            <pc:docMk/>
+            <pc:sldMk cId="1452426237" sldId="288"/>
+            <ac:spMk id="2" creationId="{E9435C31-71A7-4FEE-8599-05BEEEF82C41}"/>
+          </ac:spMkLst>
+        </pc:spChg>
+        <pc:spChg chg="mod">
+          <ac:chgData name="Geoff Butcher" userId="1cb31d20-838c-4d88-81d0-dc1a78ccb326" providerId="ADAL" clId="{A42B9E86-A0DE-4982-A141-66AF500C2B3B}" dt="2021-02-08T11:57:42.325" v="5682" actId="207"/>
+          <ac:spMkLst>
+            <pc:docMk/>
+            <pc:sldMk cId="1452426237" sldId="288"/>
+            <ac:spMk id="3" creationId="{A4E53686-6F6E-44D9-A63E-49937C384A92}"/>
+          </ac:spMkLst>
+        </pc:spChg>
+        <pc:spChg chg="add mod">
+          <ac:chgData name="Geoff Butcher" userId="1cb31d20-838c-4d88-81d0-dc1a78ccb326" providerId="ADAL" clId="{A42B9E86-A0DE-4982-A141-66AF500C2B3B}" dt="2021-02-08T11:58:43.777" v="5805" actId="20577"/>
+          <ac:spMkLst>
+            <pc:docMk/>
+            <pc:sldMk cId="1452426237" sldId="288"/>
+            <ac:spMk id="8" creationId="{DA72F87D-2204-43D0-827F-CEDBA9C15A4F}"/>
+          </ac:spMkLst>
+        </pc:spChg>
+        <pc:picChg chg="add del mod">
+          <ac:chgData name="Geoff Butcher" userId="1cb31d20-838c-4d88-81d0-dc1a78ccb326" providerId="ADAL" clId="{A42B9E86-A0DE-4982-A141-66AF500C2B3B}" dt="2021-02-08T11:55:34.914" v="5386" actId="478"/>
+          <ac:picMkLst>
+            <pc:docMk/>
+            <pc:sldMk cId="1452426237" sldId="288"/>
+            <ac:picMk id="5" creationId="{191CB9DA-6618-4C45-9771-02A4EE0F3619}"/>
+          </ac:picMkLst>
+        </pc:picChg>
+        <pc:picChg chg="add mod">
+          <ac:chgData name="Geoff Butcher" userId="1cb31d20-838c-4d88-81d0-dc1a78ccb326" providerId="ADAL" clId="{A42B9E86-A0DE-4982-A141-66AF500C2B3B}" dt="2021-02-08T11:56:08.847" v="5393" actId="1076"/>
+          <ac:picMkLst>
+            <pc:docMk/>
+            <pc:sldMk cId="1452426237" sldId="288"/>
+            <ac:picMk id="7" creationId="{1412C712-37D6-4049-878F-EFCFCB4B8F0A}"/>
+          </ac:picMkLst>
+        </pc:picChg>
+      </pc:sldChg>
+      <pc:sldChg chg="addSp modSp new mod">
+        <pc:chgData name="Geoff Butcher" userId="1cb31d20-838c-4d88-81d0-dc1a78ccb326" providerId="ADAL" clId="{A42B9E86-A0DE-4982-A141-66AF500C2B3B}" dt="2021-02-08T09:12:21.374" v="5270" actId="20577"/>
+        <pc:sldMkLst>
+          <pc:docMk/>
+          <pc:sldMk cId="4262674240" sldId="289"/>
+        </pc:sldMkLst>
+        <pc:spChg chg="mod">
+          <ac:chgData name="Geoff Butcher" userId="1cb31d20-838c-4d88-81d0-dc1a78ccb326" providerId="ADAL" clId="{A42B9E86-A0DE-4982-A141-66AF500C2B3B}" dt="2021-02-08T08:38:57.718" v="4515" actId="20577"/>
+          <ac:spMkLst>
+            <pc:docMk/>
+            <pc:sldMk cId="4262674240" sldId="289"/>
+            <ac:spMk id="2" creationId="{B27589A1-B194-4BC4-984D-2F592A74AB82}"/>
+          </ac:spMkLst>
+        </pc:spChg>
+        <pc:spChg chg="mod">
+          <ac:chgData name="Geoff Butcher" userId="1cb31d20-838c-4d88-81d0-dc1a78ccb326" providerId="ADAL" clId="{A42B9E86-A0DE-4982-A141-66AF500C2B3B}" dt="2021-02-08T09:12:21.374" v="5270" actId="20577"/>
+          <ac:spMkLst>
+            <pc:docMk/>
+            <pc:sldMk cId="4262674240" sldId="289"/>
+            <ac:spMk id="3" creationId="{3C38CDB4-E66A-4A02-8A0A-FED12B13B878}"/>
+          </ac:spMkLst>
+        </pc:spChg>
+        <pc:picChg chg="add mod">
+          <ac:chgData name="Geoff Butcher" userId="1cb31d20-838c-4d88-81d0-dc1a78ccb326" providerId="ADAL" clId="{A42B9E86-A0DE-4982-A141-66AF500C2B3B}" dt="2021-02-08T08:39:44.288" v="4604" actId="1076"/>
+          <ac:picMkLst>
+            <pc:docMk/>
+            <pc:sldMk cId="4262674240" sldId="289"/>
+            <ac:picMk id="5" creationId="{4A33B21B-479D-40C3-A85E-DC8865AEA221}"/>
+          </ac:picMkLst>
+        </pc:picChg>
+      </pc:sldChg>
+      <pc:sldChg chg="addSp modSp new mod ord">
+        <pc:chgData name="Geoff Butcher" userId="1cb31d20-838c-4d88-81d0-dc1a78ccb326" providerId="ADAL" clId="{A42B9E86-A0DE-4982-A141-66AF500C2B3B}" dt="2021-02-08T09:11:00.024" v="5176" actId="207"/>
+        <pc:sldMkLst>
+          <pc:docMk/>
+          <pc:sldMk cId="69138350" sldId="290"/>
+        </pc:sldMkLst>
+        <pc:spChg chg="mod">
+          <ac:chgData name="Geoff Butcher" userId="1cb31d20-838c-4d88-81d0-dc1a78ccb326" providerId="ADAL" clId="{A42B9E86-A0DE-4982-A141-66AF500C2B3B}" dt="2021-02-08T08:40:18.847" v="4686" actId="20577"/>
+          <ac:spMkLst>
+            <pc:docMk/>
+            <pc:sldMk cId="69138350" sldId="290"/>
+            <ac:spMk id="2" creationId="{4B788D8F-E640-44EE-9B28-2C47CF2C2E9F}"/>
+          </ac:spMkLst>
+        </pc:spChg>
+        <pc:spChg chg="mod">
+          <ac:chgData name="Geoff Butcher" userId="1cb31d20-838c-4d88-81d0-dc1a78ccb326" providerId="ADAL" clId="{A42B9E86-A0DE-4982-A141-66AF500C2B3B}" dt="2021-02-08T09:11:00.024" v="5176" actId="207"/>
+          <ac:spMkLst>
+            <pc:docMk/>
+            <pc:sldMk cId="69138350" sldId="290"/>
+            <ac:spMk id="3" creationId="{D1985B59-5E64-4229-B564-9C11982DA13C}"/>
+          </ac:spMkLst>
+        </pc:spChg>
+        <pc:picChg chg="add mod">
+          <ac:chgData name="Geoff Butcher" userId="1cb31d20-838c-4d88-81d0-dc1a78ccb326" providerId="ADAL" clId="{A42B9E86-A0DE-4982-A141-66AF500C2B3B}" dt="2021-02-08T09:09:45.746" v="4912" actId="1076"/>
+          <ac:picMkLst>
+            <pc:docMk/>
+            <pc:sldMk cId="69138350" sldId="290"/>
+            <ac:picMk id="5" creationId="{20FC64F6-5B3B-4078-8250-52449BBD0AE9}"/>
+          </ac:picMkLst>
+        </pc:picChg>
+      </pc:sldChg>
+      <pc:sldChg chg="addSp modSp new mod">
+        <pc:chgData name="Geoff Butcher" userId="1cb31d20-838c-4d88-81d0-dc1a78ccb326" providerId="ADAL" clId="{A42B9E86-A0DE-4982-A141-66AF500C2B3B}" dt="2021-02-08T09:14:07.916" v="5383" actId="20577"/>
+        <pc:sldMkLst>
+          <pc:docMk/>
+          <pc:sldMk cId="2118186357" sldId="291"/>
+        </pc:sldMkLst>
+        <pc:spChg chg="mod">
+          <ac:chgData name="Geoff Butcher" userId="1cb31d20-838c-4d88-81d0-dc1a78ccb326" providerId="ADAL" clId="{A42B9E86-A0DE-4982-A141-66AF500C2B3B}" dt="2021-02-08T09:12:29.734" v="5283" actId="20577"/>
+          <ac:spMkLst>
+            <pc:docMk/>
+            <pc:sldMk cId="2118186357" sldId="291"/>
+            <ac:spMk id="2" creationId="{889B934A-5510-4728-9B5A-778E807AB89C}"/>
+          </ac:spMkLst>
+        </pc:spChg>
+        <pc:spChg chg="mod">
+          <ac:chgData name="Geoff Butcher" userId="1cb31d20-838c-4d88-81d0-dc1a78ccb326" providerId="ADAL" clId="{A42B9E86-A0DE-4982-A141-66AF500C2B3B}" dt="2021-02-08T09:14:07.916" v="5383" actId="20577"/>
+          <ac:spMkLst>
+            <pc:docMk/>
+            <pc:sldMk cId="2118186357" sldId="291"/>
+            <ac:spMk id="3" creationId="{73A57BF7-1B11-413C-9473-4DFCD88D9E1B}"/>
+          </ac:spMkLst>
+        </pc:spChg>
+        <pc:picChg chg="add mod">
+          <ac:chgData name="Geoff Butcher" userId="1cb31d20-838c-4d88-81d0-dc1a78ccb326" providerId="ADAL" clId="{A42B9E86-A0DE-4982-A141-66AF500C2B3B}" dt="2021-02-08T09:13:22.858" v="5293" actId="27614"/>
+          <ac:picMkLst>
+            <pc:docMk/>
+            <pc:sldMk cId="2118186357" sldId="291"/>
+            <ac:picMk id="5" creationId="{61103B89-2244-45F0-95EB-9847A93D83D5}"/>
+          </ac:picMkLst>
+        </pc:picChg>
+      </pc:sldChg>
+      <pc:sldChg chg="addSp modSp new mod">
+        <pc:chgData name="Geoff Butcher" userId="1cb31d20-838c-4d88-81d0-dc1a78ccb326" providerId="ADAL" clId="{A42B9E86-A0DE-4982-A141-66AF500C2B3B}" dt="2021-02-08T12:02:15.302" v="6181" actId="20577"/>
+        <pc:sldMkLst>
+          <pc:docMk/>
+          <pc:sldMk cId="469602028" sldId="292"/>
+        </pc:sldMkLst>
+        <pc:spChg chg="mod">
+          <ac:chgData name="Geoff Butcher" userId="1cb31d20-838c-4d88-81d0-dc1a78ccb326" providerId="ADAL" clId="{A42B9E86-A0DE-4982-A141-66AF500C2B3B}" dt="2021-02-08T11:59:05.686" v="5830" actId="20577"/>
+          <ac:spMkLst>
+            <pc:docMk/>
+            <pc:sldMk cId="469602028" sldId="292"/>
+            <ac:spMk id="2" creationId="{A0A94A42-AEA0-4D89-964D-C0B9EF281361}"/>
+          </ac:spMkLst>
+        </pc:spChg>
+        <pc:spChg chg="mod">
+          <ac:chgData name="Geoff Butcher" userId="1cb31d20-838c-4d88-81d0-dc1a78ccb326" providerId="ADAL" clId="{A42B9E86-A0DE-4982-A141-66AF500C2B3B}" dt="2021-02-08T12:02:15.302" v="6181" actId="20577"/>
+          <ac:spMkLst>
+            <pc:docMk/>
+            <pc:sldMk cId="469602028" sldId="292"/>
+            <ac:spMk id="3" creationId="{93C8C3B7-4D34-4B7E-A5C2-E2CFB4CFDBB0}"/>
+          </ac:spMkLst>
+        </pc:spChg>
+        <pc:picChg chg="add mod">
+          <ac:chgData name="Geoff Butcher" userId="1cb31d20-838c-4d88-81d0-dc1a78ccb326" providerId="ADAL" clId="{A42B9E86-A0DE-4982-A141-66AF500C2B3B}" dt="2021-02-08T12:00:46.317" v="5837" actId="1076"/>
+          <ac:picMkLst>
+            <pc:docMk/>
+            <pc:sldMk cId="469602028" sldId="292"/>
+            <ac:picMk id="5" creationId="{6D112ABE-526F-4137-9DBF-25CBF4A9D05E}"/>
+          </ac:picMkLst>
+        </pc:picChg>
+      </pc:sldChg>
+      <pc:sldChg chg="addSp delSp modSp add mod">
+        <pc:chgData name="Geoff Butcher" userId="1cb31d20-838c-4d88-81d0-dc1a78ccb326" providerId="ADAL" clId="{A42B9E86-A0DE-4982-A141-66AF500C2B3B}" dt="2021-02-08T12:07:02.634" v="6510" actId="20577"/>
+        <pc:sldMkLst>
+          <pc:docMk/>
+          <pc:sldMk cId="418820575" sldId="293"/>
+        </pc:sldMkLst>
+        <pc:spChg chg="mod">
+          <ac:chgData name="Geoff Butcher" userId="1cb31d20-838c-4d88-81d0-dc1a78ccb326" providerId="ADAL" clId="{A42B9E86-A0DE-4982-A141-66AF500C2B3B}" dt="2021-02-08T12:07:02.634" v="6510" actId="20577"/>
+          <ac:spMkLst>
+            <pc:docMk/>
+            <pc:sldMk cId="418820575" sldId="293"/>
+            <ac:spMk id="3" creationId="{93C8C3B7-4D34-4B7E-A5C2-E2CFB4CFDBB0}"/>
+          </ac:spMkLst>
+        </pc:spChg>
+        <pc:picChg chg="del">
+          <ac:chgData name="Geoff Butcher" userId="1cb31d20-838c-4d88-81d0-dc1a78ccb326" providerId="ADAL" clId="{A42B9E86-A0DE-4982-A141-66AF500C2B3B}" dt="2021-02-08T12:02:28.735" v="6183" actId="478"/>
+          <ac:picMkLst>
+            <pc:docMk/>
+            <pc:sldMk cId="418820575" sldId="293"/>
+            <ac:picMk id="5" creationId="{6D112ABE-526F-4137-9DBF-25CBF4A9D05E}"/>
+          </ac:picMkLst>
+        </pc:picChg>
+        <pc:picChg chg="add del mod">
+          <ac:chgData name="Geoff Butcher" userId="1cb31d20-838c-4d88-81d0-dc1a78ccb326" providerId="ADAL" clId="{A42B9E86-A0DE-4982-A141-66AF500C2B3B}" dt="2021-02-08T12:03:14.821" v="6190" actId="478"/>
+          <ac:picMkLst>
+            <pc:docMk/>
+            <pc:sldMk cId="418820575" sldId="293"/>
+            <ac:picMk id="6" creationId="{D8B7043F-92E5-45A0-842C-BE508381019A}"/>
+          </ac:picMkLst>
+        </pc:picChg>
+        <pc:picChg chg="add mod">
+          <ac:chgData name="Geoff Butcher" userId="1cb31d20-838c-4d88-81d0-dc1a78ccb326" providerId="ADAL" clId="{A42B9E86-A0DE-4982-A141-66AF500C2B3B}" dt="2021-02-08T12:05:37.402" v="6193" actId="27614"/>
+          <ac:picMkLst>
+            <pc:docMk/>
+            <pc:sldMk cId="418820575" sldId="293"/>
+            <ac:picMk id="8" creationId="{711F389A-4AD3-44F1-827F-3B48C61EFC5D}"/>
+          </ac:picMkLst>
+        </pc:picChg>
+      </pc:sldChg>
+      <pc:sldChg chg="addSp modSp new mod">
+        <pc:chgData name="Geoff Butcher" userId="1cb31d20-838c-4d88-81d0-dc1a78ccb326" providerId="ADAL" clId="{A42B9E86-A0DE-4982-A141-66AF500C2B3B}" dt="2021-02-08T12:15:06.152" v="7210" actId="20577"/>
+        <pc:sldMkLst>
+          <pc:docMk/>
+          <pc:sldMk cId="170133376" sldId="294"/>
+        </pc:sldMkLst>
+        <pc:spChg chg="mod">
+          <ac:chgData name="Geoff Butcher" userId="1cb31d20-838c-4d88-81d0-dc1a78ccb326" providerId="ADAL" clId="{A42B9E86-A0DE-4982-A141-66AF500C2B3B}" dt="2021-02-08T12:07:17.709" v="6533" actId="20577"/>
+          <ac:spMkLst>
+            <pc:docMk/>
+            <pc:sldMk cId="170133376" sldId="294"/>
+            <ac:spMk id="2" creationId="{7FBE8BF9-2297-401B-96A8-D7B9EE3FDA05}"/>
+          </ac:spMkLst>
+        </pc:spChg>
+        <pc:spChg chg="mod">
+          <ac:chgData name="Geoff Butcher" userId="1cb31d20-838c-4d88-81d0-dc1a78ccb326" providerId="ADAL" clId="{A42B9E86-A0DE-4982-A141-66AF500C2B3B}" dt="2021-02-08T12:15:06.152" v="7210" actId="20577"/>
+          <ac:spMkLst>
+            <pc:docMk/>
+            <pc:sldMk cId="170133376" sldId="294"/>
+            <ac:spMk id="3" creationId="{6A924FDE-9600-43F7-8E67-8843B2847DA5}"/>
+          </ac:spMkLst>
+        </pc:spChg>
+        <pc:picChg chg="add mod">
+          <ac:chgData name="Geoff Butcher" userId="1cb31d20-838c-4d88-81d0-dc1a78ccb326" providerId="ADAL" clId="{A42B9E86-A0DE-4982-A141-66AF500C2B3B}" dt="2021-02-08T12:13:07.465" v="6799" actId="27614"/>
+          <ac:picMkLst>
+            <pc:docMk/>
+            <pc:sldMk cId="170133376" sldId="294"/>
+            <ac:picMk id="5" creationId="{109DFEB7-0FFC-43FA-B43A-7ACAC1D80E63}"/>
+          </ac:picMkLst>
+        </pc:picChg>
+      </pc:sldChg>
+      <pc:sldChg chg="modSp new mod">
+        <pc:chgData name="Geoff Butcher" userId="1cb31d20-838c-4d88-81d0-dc1a78ccb326" providerId="ADAL" clId="{A42B9E86-A0DE-4982-A141-66AF500C2B3B}" dt="2021-02-08T12:17:00.906" v="7622" actId="20577"/>
+        <pc:sldMkLst>
+          <pc:docMk/>
+          <pc:sldMk cId="2162200981" sldId="295"/>
+        </pc:sldMkLst>
+        <pc:spChg chg="mod">
+          <ac:chgData name="Geoff Butcher" userId="1cb31d20-838c-4d88-81d0-dc1a78ccb326" providerId="ADAL" clId="{A42B9E86-A0DE-4982-A141-66AF500C2B3B}" dt="2021-02-08T12:15:29.339" v="7303" actId="20577"/>
+          <ac:spMkLst>
+            <pc:docMk/>
+            <pc:sldMk cId="2162200981" sldId="295"/>
+            <ac:spMk id="2" creationId="{D4C7AB93-C5AC-4CC3-BA8C-7B5323665E5E}"/>
+          </ac:spMkLst>
+        </pc:spChg>
+        <pc:spChg chg="mod">
+          <ac:chgData name="Geoff Butcher" userId="1cb31d20-838c-4d88-81d0-dc1a78ccb326" providerId="ADAL" clId="{A42B9E86-A0DE-4982-A141-66AF500C2B3B}" dt="2021-02-08T12:17:00.906" v="7622" actId="20577"/>
+          <ac:spMkLst>
+            <pc:docMk/>
+            <pc:sldMk cId="2162200981" sldId="295"/>
+            <ac:spMk id="3" creationId="{428BBB71-2B59-49E0-B4AC-4AB134217278}"/>
+          </ac:spMkLst>
+        </pc:spChg>
+      </pc:sldChg>
+      <pc:sldMasterChg chg="modSldLayout">
+        <pc:chgData name="Geoff Butcher" userId="1cb31d20-838c-4d88-81d0-dc1a78ccb326" providerId="ADAL" clId="{A42B9E86-A0DE-4982-A141-66AF500C2B3B}" dt="2021-02-07T18:18:47.822" v="263" actId="115"/>
+        <pc:sldMasterMkLst>
+          <pc:docMk/>
+          <pc:sldMasterMk cId="1309764198" sldId="2147483648"/>
+        </pc:sldMasterMkLst>
+        <pc:sldLayoutChg chg="delSp modSp mod">
+          <pc:chgData name="Geoff Butcher" userId="1cb31d20-838c-4d88-81d0-dc1a78ccb326" providerId="ADAL" clId="{A42B9E86-A0DE-4982-A141-66AF500C2B3B}" dt="2021-02-07T18:18:47.822" v="263" actId="115"/>
+          <pc:sldLayoutMkLst>
+            <pc:docMk/>
+            <pc:sldMasterMk cId="1309764198" sldId="2147483648"/>
+            <pc:sldLayoutMk cId="458035802" sldId="2147483650"/>
+          </pc:sldLayoutMkLst>
+          <pc:spChg chg="mod">
+            <ac:chgData name="Geoff Butcher" userId="1cb31d20-838c-4d88-81d0-dc1a78ccb326" providerId="ADAL" clId="{A42B9E86-A0DE-4982-A141-66AF500C2B3B}" dt="2021-02-07T18:18:47.822" v="263" actId="115"/>
+            <ac:spMkLst>
+              <pc:docMk/>
+              <pc:sldMasterMk cId="1309764198" sldId="2147483648"/>
+              <pc:sldLayoutMk cId="458035802" sldId="2147483650"/>
+              <ac:spMk id="12" creationId="{F4478CD4-CD97-4F35-8C52-137DF21BED6A}"/>
+            </ac:spMkLst>
+          </pc:spChg>
+          <pc:graphicFrameChg chg="del mod">
+            <ac:chgData name="Geoff Butcher" userId="1cb31d20-838c-4d88-81d0-dc1a78ccb326" providerId="ADAL" clId="{A42B9E86-A0DE-4982-A141-66AF500C2B3B}" dt="2021-02-07T18:17:13.340" v="37" actId="478"/>
+            <ac:graphicFrameMkLst>
+              <pc:docMk/>
+              <pc:sldMasterMk cId="1309764198" sldId="2147483648"/>
+              <pc:sldLayoutMk cId="458035802" sldId="2147483650"/>
+              <ac:graphicFrameMk id="6" creationId="{2F68D10A-6776-4E33-B03D-39B5D5059C80}"/>
+            </ac:graphicFrameMkLst>
+          </pc:graphicFrameChg>
+        </pc:sldLayoutChg>
+      </pc:sldMasterChg>
+    </pc:docChg>
+  </pc:docChgLst>
 </pc:chgInfo>
 </file>
 
@@ -2687,7 +2687,7 @@
           <a:p>
             <a:fld id="{876E1AAC-1B4B-43C2-BAA4-F907AA38FBA2}" type="datetimeFigureOut">
               <a:rPr lang="en-GB" smtClean="0"/>
-              <a:t>11/02/2021</a:t>
+              <a:t>01/12/2022</a:t>
             </a:fld>
             <a:endParaRPr lang="en-GB"/>
           </a:p>
@@ -2887,7 +2887,7 @@
           <a:p>
             <a:fld id="{876E1AAC-1B4B-43C2-BAA4-F907AA38FBA2}" type="datetimeFigureOut">
               <a:rPr lang="en-GB" smtClean="0"/>
-              <a:t>11/02/2021</a:t>
+              <a:t>01/12/2022</a:t>
             </a:fld>
             <a:endParaRPr lang="en-GB"/>
           </a:p>
@@ -3097,7 +3097,7 @@
           <a:p>
             <a:fld id="{876E1AAC-1B4B-43C2-BAA4-F907AA38FBA2}" type="datetimeFigureOut">
               <a:rPr lang="en-GB" smtClean="0"/>
-              <a:t>11/02/2021</a:t>
+              <a:t>01/12/2022</a:t>
             </a:fld>
             <a:endParaRPr lang="en-GB"/>
           </a:p>
@@ -3815,7 +3815,7 @@
           <a:p>
             <a:fld id="{876E1AAC-1B4B-43C2-BAA4-F907AA38FBA2}" type="datetimeFigureOut">
               <a:rPr lang="en-GB" smtClean="0"/>
-              <a:t>11/02/2021</a:t>
+              <a:t>01/12/2022</a:t>
             </a:fld>
             <a:endParaRPr lang="en-GB"/>
           </a:p>
@@ -4083,7 +4083,7 @@
           <a:p>
             <a:fld id="{876E1AAC-1B4B-43C2-BAA4-F907AA38FBA2}" type="datetimeFigureOut">
               <a:rPr lang="en-GB" smtClean="0"/>
-              <a:t>11/02/2021</a:t>
+              <a:t>01/12/2022</a:t>
             </a:fld>
             <a:endParaRPr lang="en-GB"/>
           </a:p>
@@ -4498,7 +4498,7 @@
           <a:p>
             <a:fld id="{876E1AAC-1B4B-43C2-BAA4-F907AA38FBA2}" type="datetimeFigureOut">
               <a:rPr lang="en-GB" smtClean="0"/>
-              <a:t>11/02/2021</a:t>
+              <a:t>01/12/2022</a:t>
             </a:fld>
             <a:endParaRPr lang="en-GB"/>
           </a:p>
@@ -4640,7 +4640,7 @@
           <a:p>
             <a:fld id="{876E1AAC-1B4B-43C2-BAA4-F907AA38FBA2}" type="datetimeFigureOut">
               <a:rPr lang="en-GB" smtClean="0"/>
-              <a:t>11/02/2021</a:t>
+              <a:t>01/12/2022</a:t>
             </a:fld>
             <a:endParaRPr lang="en-GB"/>
           </a:p>
@@ -4753,7 +4753,7 @@
           <a:p>
             <a:fld id="{876E1AAC-1B4B-43C2-BAA4-F907AA38FBA2}" type="datetimeFigureOut">
               <a:rPr lang="en-GB" smtClean="0"/>
-              <a:t>11/02/2021</a:t>
+              <a:t>01/12/2022</a:t>
             </a:fld>
             <a:endParaRPr lang="en-GB"/>
           </a:p>
@@ -5066,7 +5066,7 @@
           <a:p>
             <a:fld id="{876E1AAC-1B4B-43C2-BAA4-F907AA38FBA2}" type="datetimeFigureOut">
               <a:rPr lang="en-GB" smtClean="0"/>
-              <a:t>11/02/2021</a:t>
+              <a:t>01/12/2022</a:t>
             </a:fld>
             <a:endParaRPr lang="en-GB"/>
           </a:p>
@@ -5355,7 +5355,7 @@
           <a:p>
             <a:fld id="{876E1AAC-1B4B-43C2-BAA4-F907AA38FBA2}" type="datetimeFigureOut">
               <a:rPr lang="en-GB" smtClean="0"/>
-              <a:t>11/02/2021</a:t>
+              <a:t>01/12/2022</a:t>
             </a:fld>
             <a:endParaRPr lang="en-GB"/>
           </a:p>
@@ -5598,7 +5598,7 @@
           <a:p>
             <a:fld id="{876E1AAC-1B4B-43C2-BAA4-F907AA38FBA2}" type="datetimeFigureOut">
               <a:rPr lang="en-GB" smtClean="0"/>
-              <a:t>11/02/2021</a:t>
+              <a:t>01/12/2022</a:t>
             </a:fld>
             <a:endParaRPr lang="en-GB"/>
           </a:p>
@@ -6193,7 +6193,7 @@
               <a:buNone/>
             </a:pPr>
             <a:r>
-              <a:rPr lang="en-US"/>
+              <a:rPr lang="en-US" dirty="0"/>
               <a:t>As mentioned earlier we are going to relocate the eaten food item as oppose to deleting it and creating another. </a:t>
             </a:r>
           </a:p>
@@ -6201,17 +6201,17 @@
             <a:pPr marL="0" indent="0">
               <a:buNone/>
             </a:pPr>
-            <a:endParaRPr lang="en-US"/>
+            <a:endParaRPr lang="en-US" dirty="0"/>
           </a:p>
           <a:p>
             <a:pPr marL="0" indent="0">
               <a:buNone/>
             </a:pPr>
             <a:r>
-              <a:rPr lang="en-US"/>
+              <a:rPr lang="en-US" dirty="0"/>
               <a:t>We know when the move flag is TRUE we want to generate a new position on the screen to move the Food item ( a turtle object). </a:t>
             </a:r>
-            <a:endParaRPr lang="en-GB"/>
+            <a:endParaRPr lang="en-GB" dirty="0"/>
           </a:p>
         </p:txBody>
       </p:sp>
@@ -6848,49 +6848,49 @@
               <a:buNone/>
             </a:pPr>
             <a:r>
-              <a:rPr lang="en-US"/>
-              <a:t>The snake body will grow by one block each time the snake eats a food item. Each block of the the snake body will be make up of another instantiated turtle object</a:t>
+              <a:rPr lang="en-US" dirty="0"/>
+              <a:t>The snake body will grow by one block each time the snake eats a food item. Each block of the snake body will be made up of another instantiated turtle object</a:t>
             </a:r>
           </a:p>
           <a:p>
             <a:pPr marL="0" indent="0">
               <a:buNone/>
             </a:pPr>
-            <a:endParaRPr lang="en-US"/>
+            <a:endParaRPr lang="en-US" dirty="0"/>
           </a:p>
           <a:p>
             <a:pPr marL="0" indent="0">
               <a:buNone/>
             </a:pPr>
-            <a:endParaRPr lang="en-US"/>
+            <a:endParaRPr lang="en-US" dirty="0"/>
           </a:p>
           <a:p>
             <a:pPr marL="0" indent="0">
               <a:buNone/>
             </a:pPr>
-            <a:endParaRPr lang="en-US"/>
+            <a:endParaRPr lang="en-US" dirty="0"/>
           </a:p>
           <a:p>
             <a:pPr marL="0" indent="0">
               <a:buNone/>
             </a:pPr>
-            <a:endParaRPr lang="en-US"/>
+            <a:endParaRPr lang="en-US" dirty="0"/>
           </a:p>
           <a:p>
             <a:pPr marL="0" indent="0">
               <a:buNone/>
             </a:pPr>
-            <a:endParaRPr lang="en-US"/>
+            <a:endParaRPr lang="en-US" dirty="0"/>
           </a:p>
           <a:p>
             <a:pPr marL="0" indent="0">
               <a:buNone/>
             </a:pPr>
             <a:r>
-              <a:rPr lang="en-US"/>
+              <a:rPr lang="en-US" dirty="0"/>
               <a:t>We will store these as an array in an attribute in the class snake</a:t>
             </a:r>
-            <a:endParaRPr lang="en-GB"/>
+            <a:endParaRPr lang="en-GB" dirty="0"/>
           </a:p>
         </p:txBody>
       </p:sp>
@@ -9486,7 +9486,7 @@
               <a:buNone/>
             </a:pPr>
             <a:r>
-              <a:rPr lang="en-US"/>
+              <a:rPr lang="en-US" dirty="0"/>
               <a:t>Here we can see our new algorithm using a for loop in to move through the snake body in reverse order towards the snake head</a:t>
             </a:r>
           </a:p>
@@ -9494,13 +9494,13 @@
             <a:pPr marL="0" indent="0">
               <a:buNone/>
             </a:pPr>
-            <a:endParaRPr lang="en-US"/>
+            <a:endParaRPr lang="en-US" dirty="0"/>
           </a:p>
           <a:p>
             <a:pPr marL="0" indent="0">
               <a:buNone/>
             </a:pPr>
-            <a:endParaRPr lang="en-GB"/>
+            <a:endParaRPr lang="en-GB" dirty="0"/>
           </a:p>
         </p:txBody>
       </p:sp>
@@ -11114,7 +11114,7 @@
               <a:buNone/>
             </a:pPr>
             <a:r>
-              <a:rPr lang="en-US"/>
+              <a:rPr lang="en-US" dirty="0"/>
               <a:t>Compare code you have written back to the snippets shown</a:t>
             </a:r>
           </a:p>
@@ -11122,14 +11122,14 @@
             <a:pPr marL="0" indent="0">
               <a:buNone/>
             </a:pPr>
-            <a:endParaRPr lang="en-US"/>
+            <a:endParaRPr lang="en-US" dirty="0"/>
           </a:p>
           <a:p>
             <a:pPr marL="0" indent="0">
               <a:buNone/>
             </a:pPr>
             <a:r>
-              <a:rPr lang="en-US"/>
+              <a:rPr lang="en-US" dirty="0"/>
               <a:t>If you are unsure about where the code should go in terms of files or class, have a look back at the class diagrams.</a:t>
             </a:r>
           </a:p>
@@ -11137,20 +11137,20 @@
             <a:pPr marL="0" indent="0">
               <a:buNone/>
             </a:pPr>
-            <a:endParaRPr lang="en-US"/>
+            <a:endParaRPr lang="en-US" dirty="0"/>
           </a:p>
           <a:p>
             <a:pPr marL="0" indent="0">
               <a:buNone/>
             </a:pPr>
-            <a:endParaRPr lang="en-US"/>
+            <a:endParaRPr lang="en-US" dirty="0"/>
           </a:p>
           <a:p>
             <a:pPr marL="0" indent="0">
               <a:buNone/>
             </a:pPr>
             <a:r>
-              <a:rPr lang="en-US">
+              <a:rPr lang="en-US" dirty="0">
                 <a:solidFill>
                   <a:schemeClr val="accent4"/>
                 </a:solidFill>
@@ -11158,7 +11158,7 @@
               <a:t>The snake body part added after eating food is automatically created at the center of the screen before then being moved to the rear of the snake. </a:t>
             </a:r>
             <a:r>
-              <a:rPr lang="en-US">
+              <a:rPr lang="en-US" dirty="0">
                 <a:solidFill>
                   <a:schemeClr val="accent5"/>
                 </a:solidFill>
@@ -11170,25 +11170,25 @@
             <a:pPr marL="0" indent="0">
               <a:buNone/>
             </a:pPr>
-            <a:endParaRPr lang="en-US"/>
+            <a:endParaRPr lang="en-US" dirty="0"/>
           </a:p>
           <a:p>
             <a:pPr marL="0" indent="0">
               <a:buNone/>
             </a:pPr>
-            <a:endParaRPr lang="en-US"/>
+            <a:endParaRPr lang="en-US" dirty="0"/>
           </a:p>
           <a:p>
             <a:pPr marL="0" indent="0">
               <a:buNone/>
             </a:pPr>
-            <a:endParaRPr lang="en-US"/>
+            <a:endParaRPr lang="en-US" dirty="0"/>
           </a:p>
           <a:p>
             <a:pPr marL="0" indent="0">
               <a:buNone/>
             </a:pPr>
-            <a:endParaRPr lang="en-GB"/>
+            <a:endParaRPr lang="en-GB" dirty="0"/>
           </a:p>
         </p:txBody>
       </p:sp>
@@ -13028,6 +13028,15 @@
 </file>
 
 <file path=customXml/item1.xml><?xml version="1.0" encoding="utf-8"?>
+<?mso-contentType ?>
+<FormTemplates xmlns="http://schemas.microsoft.com/sharepoint/v3/contenttype/forms">
+  <Display>DocumentLibraryForm</Display>
+  <Edit>DocumentLibraryForm</Edit>
+  <New>DocumentLibraryForm</New>
+</FormTemplates>
+</file>
+
+<file path=customXml/item2.xml><?xml version="1.0" encoding="utf-8"?>
 <ct:contentTypeSchema xmlns:ct="http://schemas.microsoft.com/office/2006/metadata/contentType" xmlns:ma="http://schemas.microsoft.com/office/2006/metadata/properties/metaAttributes" ct:_="" ma:_="" ma:contentTypeName="Document" ma:contentTypeID="0x010100DF8E5D52D10F094F90CD096FDD8D50BB" ma:contentTypeVersion="13" ma:contentTypeDescription="Create a new document." ma:contentTypeScope="" ma:versionID="e7e56ba677b97506ee73cda3f879ec48">
   <xsd:schema xmlns:xsd="http://www.w3.org/2001/XMLSchema" xmlns:xs="http://www.w3.org/2001/XMLSchema" xmlns:p="http://schemas.microsoft.com/office/2006/metadata/properties" xmlns:ns2="28120cba-d646-48ff-9803-d9518bc6aa84" xmlns:ns3="71cd201e-07a2-43b7-86be-e46b014e0d90" targetNamespace="http://schemas.microsoft.com/office/2006/metadata/properties" ma:root="true" ma:fieldsID="7d8cf170f5b80be8b95c7f106a0f1888" ns2:_="" ns3:_="">
     <xsd:import namespace="28120cba-d646-48ff-9803-d9518bc6aa84"/>
@@ -13236,19 +13245,29 @@
 </ct:contentTypeSchema>
 </file>
 
-<file path=customXml/item2.xml><?xml version="1.0" encoding="utf-8"?>
-<?mso-contentType ?>
-<FormTemplates xmlns="http://schemas.microsoft.com/sharepoint/v3/contenttype/forms">
-  <Display>DocumentLibraryForm</Display>
-  <Edit>DocumentLibraryForm</Edit>
-  <New>DocumentLibraryForm</New>
-</FormTemplates>
-</file>
-
 <file path=customXml/itemProps1.xml><?xml version="1.0" encoding="utf-8"?>
-<ds:datastoreItem xmlns:ds="http://schemas.openxmlformats.org/officeDocument/2006/customXml" ds:itemID="{5BDCC82F-6246-48CD-960B-0C78F9FAD85D}"/>
+<ds:datastoreItem xmlns:ds="http://schemas.openxmlformats.org/officeDocument/2006/customXml" ds:itemID="{9287E9EE-F189-489E-8FA2-45EF50AA79AB}">
+  <ds:schemaRefs>
+    <ds:schemaRef ds:uri="http://schemas.microsoft.com/sharepoint/v3/contenttype/forms"/>
+  </ds:schemaRefs>
+</ds:datastoreItem>
 </file>
 
 <file path=customXml/itemProps2.xml><?xml version="1.0" encoding="utf-8"?>
-<ds:datastoreItem xmlns:ds="http://schemas.openxmlformats.org/officeDocument/2006/customXml" ds:itemID="{9287E9EE-F189-489E-8FA2-45EF50AA79AB}"/>
+<ds:datastoreItem xmlns:ds="http://schemas.openxmlformats.org/officeDocument/2006/customXml" ds:itemID="{5BDCC82F-6246-48CD-960B-0C78F9FAD85D}">
+  <ds:schemaRefs>
+    <ds:schemaRef ds:uri="http://schemas.microsoft.com/office/2006/metadata/contentType"/>
+    <ds:schemaRef ds:uri="http://schemas.microsoft.com/office/2006/metadata/properties/metaAttributes"/>
+    <ds:schemaRef ds:uri="http://www.w3.org/2001/XMLSchema"/>
+    <ds:schemaRef ds:uri="http://schemas.microsoft.com/office/2006/metadata/properties"/>
+    <ds:schemaRef ds:uri="28120cba-d646-48ff-9803-d9518bc6aa84"/>
+    <ds:schemaRef ds:uri="71cd201e-07a2-43b7-86be-e46b014e0d90"/>
+    <ds:schemaRef ds:uri="http://schemas.microsoft.com/office/2006/documentManagement/types"/>
+    <ds:schemaRef ds:uri="http://schemas.microsoft.com/office/infopath/2007/PartnerControls"/>
+    <ds:schemaRef ds:uri="http://schemas.openxmlformats.org/package/2006/metadata/core-properties"/>
+    <ds:schemaRef ds:uri="http://purl.org/dc/elements/1.1/"/>
+    <ds:schemaRef ds:uri="http://purl.org/dc/terms/"/>
+    <ds:schemaRef ds:uri="http://schemas.microsoft.com/internal/obd"/>
+  </ds:schemaRefs>
+</ds:datastoreItem>
 </file>
</xml_diff>